<commit_message>
apparently i uploaded the base file and not the one that was saved in one drive before, so here is the correct one
</commit_message>
<xml_diff>
--- a/ASSN_3.pptx
+++ b/ASSN_3.pptx
@@ -2,19 +2,18 @@
 <file path=ppt/presentation.xml><?xml version="1.0" encoding="utf-8"?>
 <p:presentation xmlns:a="http://schemas.openxmlformats.org/drawingml/2006/main" xmlns:r="http://schemas.openxmlformats.org/officeDocument/2006/relationships" xmlns:p="http://schemas.openxmlformats.org/presentationml/2006/main" saveSubsetFonts="1">
   <p:sldMasterIdLst>
-    <p:sldMasterId id="2147483648" r:id="rId1"/>
+    <p:sldMasterId id="2147483648" r:id="rId4"/>
   </p:sldMasterIdLst>
   <p:sldIdLst>
-    <p:sldId id="256" r:id="rId2"/>
-    <p:sldId id="257" r:id="rId3"/>
-    <p:sldId id="258" r:id="rId4"/>
-    <p:sldId id="259" r:id="rId5"/>
-    <p:sldId id="260" r:id="rId6"/>
-    <p:sldId id="261" r:id="rId7"/>
-    <p:sldId id="262" r:id="rId8"/>
-    <p:sldId id="263" r:id="rId9"/>
-    <p:sldId id="264" r:id="rId10"/>
-    <p:sldId id="265" r:id="rId11"/>
+    <p:sldId id="256" r:id="rId5"/>
+    <p:sldId id="258" r:id="rId6"/>
+    <p:sldId id="259" r:id="rId7"/>
+    <p:sldId id="261" r:id="rId8"/>
+    <p:sldId id="266" r:id="rId9"/>
+    <p:sldId id="262" r:id="rId10"/>
+    <p:sldId id="263" r:id="rId11"/>
+    <p:sldId id="264" r:id="rId12"/>
+    <p:sldId id="265" r:id="rId13"/>
   </p:sldIdLst>
   <p:sldSz cx="12192000" cy="6858000"/>
   <p:notesSz cx="6858000" cy="9144000"/>
@@ -113,6 +112,11 @@
       </a:defRPr>
     </a:lvl9pPr>
   </p:defaultTextStyle>
+  <p:extLst>
+    <p:ext uri="{EFAFB233-063F-42B5-8137-9DF3F51BA10A}">
+      <p15:sldGuideLst xmlns:p15="http://schemas.microsoft.com/office/powerpoint/2012/main"/>
+    </p:ext>
+  </p:extLst>
 </p:presentation>
 </file>
 
@@ -263,7 +267,7 @@
           <a:p>
             <a:fld id="{CFADEDD2-6B64-4613-BA6A-DD2DD744FAFF}" type="datetimeFigureOut">
               <a:rPr lang="en-US" smtClean="0"/>
-              <a:t>2/19/2020</a:t>
+              <a:t>3/4/2020</a:t>
             </a:fld>
             <a:endParaRPr lang="en-US"/>
           </a:p>
@@ -461,7 +465,7 @@
           <a:p>
             <a:fld id="{CFADEDD2-6B64-4613-BA6A-DD2DD744FAFF}" type="datetimeFigureOut">
               <a:rPr lang="en-US" smtClean="0"/>
-              <a:t>2/19/2020</a:t>
+              <a:t>3/4/2020</a:t>
             </a:fld>
             <a:endParaRPr lang="en-US"/>
           </a:p>
@@ -669,7 +673,7 @@
           <a:p>
             <a:fld id="{CFADEDD2-6B64-4613-BA6A-DD2DD744FAFF}" type="datetimeFigureOut">
               <a:rPr lang="en-US" smtClean="0"/>
-              <a:t>2/19/2020</a:t>
+              <a:t>3/4/2020</a:t>
             </a:fld>
             <a:endParaRPr lang="en-US"/>
           </a:p>
@@ -867,7 +871,7 @@
           <a:p>
             <a:fld id="{CFADEDD2-6B64-4613-BA6A-DD2DD744FAFF}" type="datetimeFigureOut">
               <a:rPr lang="en-US" smtClean="0"/>
-              <a:t>2/19/2020</a:t>
+              <a:t>3/4/2020</a:t>
             </a:fld>
             <a:endParaRPr lang="en-US"/>
           </a:p>
@@ -1142,7 +1146,7 @@
           <a:p>
             <a:fld id="{CFADEDD2-6B64-4613-BA6A-DD2DD744FAFF}" type="datetimeFigureOut">
               <a:rPr lang="en-US" smtClean="0"/>
-              <a:t>2/19/2020</a:t>
+              <a:t>3/4/2020</a:t>
             </a:fld>
             <a:endParaRPr lang="en-US"/>
           </a:p>
@@ -1407,7 +1411,7 @@
           <a:p>
             <a:fld id="{CFADEDD2-6B64-4613-BA6A-DD2DD744FAFF}" type="datetimeFigureOut">
               <a:rPr lang="en-US" smtClean="0"/>
-              <a:t>2/19/2020</a:t>
+              <a:t>3/4/2020</a:t>
             </a:fld>
             <a:endParaRPr lang="en-US"/>
           </a:p>
@@ -1819,7 +1823,7 @@
           <a:p>
             <a:fld id="{CFADEDD2-6B64-4613-BA6A-DD2DD744FAFF}" type="datetimeFigureOut">
               <a:rPr lang="en-US" smtClean="0"/>
-              <a:t>2/19/2020</a:t>
+              <a:t>3/4/2020</a:t>
             </a:fld>
             <a:endParaRPr lang="en-US"/>
           </a:p>
@@ -1960,7 +1964,7 @@
           <a:p>
             <a:fld id="{CFADEDD2-6B64-4613-BA6A-DD2DD744FAFF}" type="datetimeFigureOut">
               <a:rPr lang="en-US" smtClean="0"/>
-              <a:t>2/19/2020</a:t>
+              <a:t>3/4/2020</a:t>
             </a:fld>
             <a:endParaRPr lang="en-US"/>
           </a:p>
@@ -2073,7 +2077,7 @@
           <a:p>
             <a:fld id="{CFADEDD2-6B64-4613-BA6A-DD2DD744FAFF}" type="datetimeFigureOut">
               <a:rPr lang="en-US" smtClean="0"/>
-              <a:t>2/19/2020</a:t>
+              <a:t>3/4/2020</a:t>
             </a:fld>
             <a:endParaRPr lang="en-US"/>
           </a:p>
@@ -2384,7 +2388,7 @@
           <a:p>
             <a:fld id="{CFADEDD2-6B64-4613-BA6A-DD2DD744FAFF}" type="datetimeFigureOut">
               <a:rPr lang="en-US" smtClean="0"/>
-              <a:t>2/19/2020</a:t>
+              <a:t>3/4/2020</a:t>
             </a:fld>
             <a:endParaRPr lang="en-US"/>
           </a:p>
@@ -2672,7 +2676,7 @@
           <a:p>
             <a:fld id="{CFADEDD2-6B64-4613-BA6A-DD2DD744FAFF}" type="datetimeFigureOut">
               <a:rPr lang="en-US" smtClean="0"/>
-              <a:t>2/19/2020</a:t>
+              <a:t>3/4/2020</a:t>
             </a:fld>
             <a:endParaRPr lang="en-US"/>
           </a:p>
@@ -2913,7 +2917,7 @@
           <a:p>
             <a:fld id="{CFADEDD2-6B64-4613-BA6A-DD2DD744FAFF}" type="datetimeFigureOut">
               <a:rPr lang="en-US" smtClean="0"/>
-              <a:t>2/19/2020</a:t>
+              <a:t>3/4/2020</a:t>
             </a:fld>
             <a:endParaRPr lang="en-US"/>
           </a:p>
@@ -3352,9 +3356,10 @@
           <a:lstStyle/>
           <a:p>
             <a:r>
-              <a:rPr lang="en-US" dirty="0"/>
-              <a:t>Unnamed Social Media Application</a:t>
-            </a:r>
+              <a:rPr lang="en-US" dirty="0" err="1"/>
+              <a:t>Socialendar</a:t>
+            </a:r>
+            <a:endParaRPr lang="en-US" dirty="0"/>
           </a:p>
         </p:txBody>
       </p:sp>
@@ -3401,89 +3406,6 @@
     <p:extLst>
       <p:ext uri="{BB962C8B-B14F-4D97-AF65-F5344CB8AC3E}">
         <p14:creationId xmlns:p14="http://schemas.microsoft.com/office/powerpoint/2010/main" val="2251686732"/>
-      </p:ext>
-    </p:extLst>
-  </p:cSld>
-  <p:clrMapOvr>
-    <a:masterClrMapping/>
-  </p:clrMapOvr>
-</p:sld>
-</file>
-
-<file path=ppt/slides/slide10.xml><?xml version="1.0" encoding="utf-8"?>
-<p:sld xmlns:a="http://schemas.openxmlformats.org/drawingml/2006/main" xmlns:r="http://schemas.openxmlformats.org/officeDocument/2006/relationships" xmlns:p="http://schemas.openxmlformats.org/presentationml/2006/main">
-  <p:cSld>
-    <p:spTree>
-      <p:nvGrpSpPr>
-        <p:cNvPr id="1" name=""/>
-        <p:cNvGrpSpPr/>
-        <p:nvPr/>
-      </p:nvGrpSpPr>
-      <p:grpSpPr>
-        <a:xfrm>
-          <a:off x="0" y="0"/>
-          <a:ext cx="0" cy="0"/>
-          <a:chOff x="0" y="0"/>
-          <a:chExt cx="0" cy="0"/>
-        </a:xfrm>
-      </p:grpSpPr>
-      <p:sp>
-        <p:nvSpPr>
-          <p:cNvPr id="2" name="Title 1">
-            <a:extLst>
-              <a:ext uri="{FF2B5EF4-FFF2-40B4-BE49-F238E27FC236}">
-                <a16:creationId xmlns:a16="http://schemas.microsoft.com/office/drawing/2014/main" id="{45C9ABBF-F186-4A07-8CF2-D7A0574F3B4B}"/>
-              </a:ext>
-            </a:extLst>
-          </p:cNvPr>
-          <p:cNvSpPr>
-            <a:spLocks noGrp="1"/>
-          </p:cNvSpPr>
-          <p:nvPr>
-            <p:ph type="title"/>
-          </p:nvPr>
-        </p:nvSpPr>
-        <p:spPr/>
-        <p:txBody>
-          <a:bodyPr/>
-          <a:lstStyle/>
-          <a:p>
-            <a:r>
-              <a:rPr lang="en-US" dirty="0"/>
-              <a:t>Challenges</a:t>
-            </a:r>
-          </a:p>
-        </p:txBody>
-      </p:sp>
-      <p:sp>
-        <p:nvSpPr>
-          <p:cNvPr id="3" name="Content Placeholder 2">
-            <a:extLst>
-              <a:ext uri="{FF2B5EF4-FFF2-40B4-BE49-F238E27FC236}">
-                <a16:creationId xmlns:a16="http://schemas.microsoft.com/office/drawing/2014/main" id="{D99D1089-0AE5-4D5C-849B-E27340AE7678}"/>
-              </a:ext>
-            </a:extLst>
-          </p:cNvPr>
-          <p:cNvSpPr>
-            <a:spLocks noGrp="1"/>
-          </p:cNvSpPr>
-          <p:nvPr>
-            <p:ph idx="1"/>
-          </p:nvPr>
-        </p:nvSpPr>
-        <p:spPr/>
-        <p:txBody>
-          <a:bodyPr/>
-          <a:lstStyle/>
-          <a:p>
-            <a:endParaRPr lang="en-US"/>
-          </a:p>
-        </p:txBody>
-      </p:sp>
-    </p:spTree>
-    <p:extLst>
-      <p:ext uri="{BB962C8B-B14F-4D97-AF65-F5344CB8AC3E}">
-        <p14:creationId xmlns:p14="http://schemas.microsoft.com/office/powerpoint/2010/main" val="2916109359"/>
       </p:ext>
     </p:extLst>
   </p:cSld>
@@ -3515,7 +3437,7 @@
           <p:cNvPr id="2" name="Title 1">
             <a:extLst>
               <a:ext uri="{FF2B5EF4-FFF2-40B4-BE49-F238E27FC236}">
-                <a16:creationId xmlns:a16="http://schemas.microsoft.com/office/drawing/2014/main" id="{629B0DB7-2C1C-48A1-B268-CB6CC19A3A0B}"/>
+                <a16:creationId xmlns:a16="http://schemas.microsoft.com/office/drawing/2014/main" id="{C8E38D7E-3005-49BF-92DD-F19DC4F1BE10}"/>
               </a:ext>
             </a:extLst>
           </p:cNvPr>
@@ -3531,7 +3453,10 @@
           <a:bodyPr/>
           <a:lstStyle/>
           <a:p>
-            <a:endParaRPr lang="en-US"/>
+            <a:r>
+              <a:rPr lang="en-US" dirty="0"/>
+              <a:t>Goals</a:t>
+            </a:r>
           </a:p>
         </p:txBody>
       </p:sp>
@@ -3540,7 +3465,7 @@
           <p:cNvPr id="3" name="Content Placeholder 2">
             <a:extLst>
               <a:ext uri="{FF2B5EF4-FFF2-40B4-BE49-F238E27FC236}">
-                <a16:creationId xmlns:a16="http://schemas.microsoft.com/office/drawing/2014/main" id="{70E3AE0F-6CB5-4D2B-80C5-BF87D582A167}"/>
+                <a16:creationId xmlns:a16="http://schemas.microsoft.com/office/drawing/2014/main" id="{03AF60F0-3856-472A-8196-091F6E9CD628}"/>
               </a:ext>
             </a:extLst>
           </p:cNvPr>
@@ -3553,82 +3478,41 @@
         </p:nvSpPr>
         <p:spPr/>
         <p:txBody>
-          <a:bodyPr>
-            <a:normAutofit fontScale="62500" lnSpcReduction="20000"/>
-          </a:bodyPr>
+          <a:bodyPr/>
           <a:lstStyle/>
           <a:p>
             <a:r>
-              <a:rPr lang="en-US" dirty="0"/>
-              <a:t>1. Title - the project title, team members, and advisor</a:t>
-            </a:r>
-          </a:p>
-          <a:p>
-            <a:r>
-              <a:rPr lang="en-US" dirty="0"/>
-              <a:t>2.  Goals - description of the goals and the background of the project</a:t>
-            </a:r>
-          </a:p>
-          <a:p>
-            <a:r>
-              <a:rPr lang="en-US" dirty="0"/>
-              <a:t>3.  Intellectual Merits – statements about the interesting, novel, or original contributions of the project</a:t>
-            </a:r>
-          </a:p>
-          <a:p>
-            <a:r>
-              <a:rPr lang="en-US" dirty="0"/>
-              <a:t>4.  Broader Impacts – statements about how the project has potential to impact human society</a:t>
-            </a:r>
-          </a:p>
-          <a:p>
-            <a:r>
-              <a:rPr lang="en-US" dirty="0"/>
-              <a:t>5.  Design Specifications</a:t>
-            </a:r>
-          </a:p>
-          <a:p>
-            <a:r>
-              <a:rPr lang="en-US" dirty="0"/>
-              <a:t>give system overview and design diagrams</a:t>
-            </a:r>
-          </a:p>
-          <a:p>
-            <a:r>
-              <a:rPr lang="en-US" dirty="0"/>
-              <a:t>include sufficient detail necessary to understand the implementation of the project</a:t>
-            </a:r>
-          </a:p>
-          <a:p>
-            <a:r>
-              <a:rPr lang="en-US" dirty="0"/>
-              <a:t>6.  Technologies – discuss with some depth the computing technology developed and/or integrated into your project</a:t>
-            </a:r>
-          </a:p>
-          <a:p>
-            <a:r>
-              <a:rPr lang="en-US" dirty="0"/>
-              <a:t>7.  Milestones: list of milestones, deliverables with dates for the project</a:t>
-            </a:r>
-          </a:p>
-          <a:p>
-            <a:r>
-              <a:rPr lang="en-US" dirty="0"/>
-              <a:t>8.  Results: list the results you have achieved so far, and discuss your progress and the finishing tasks to complete your demo and all final deliverables.</a:t>
-            </a:r>
-          </a:p>
-          <a:p>
-            <a:r>
-              <a:rPr lang="en-US" dirty="0"/>
-              <a:t>9. Challenges: list the most significant challenges you were able to overcome through the work done on the project. Indicate your solutions to these challenges. </a:t>
-            </a:r>
+              <a:rPr lang="en-US" dirty="0">
+                <a:cs typeface="Calibri"/>
+              </a:rPr>
+              <a:t>Create a mobile application which users can use to keep track of events in their lives, and communicate with others.</a:t>
+            </a:r>
+          </a:p>
+          <a:p>
+            <a:r>
+              <a:rPr lang="en-US" dirty="0">
+                <a:cs typeface="Calibri"/>
+              </a:rPr>
+              <a:t>Allow for dynamic planning of events to fit around the rest of a user’s schedule.</a:t>
+            </a:r>
+          </a:p>
+          <a:p>
+            <a:r>
+              <a:rPr lang="en-US" dirty="0">
+                <a:cs typeface="Calibri"/>
+              </a:rPr>
+              <a:t>Automatically pull events from online that users may be interested in.</a:t>
+            </a:r>
+          </a:p>
+          <a:p>
+            <a:endParaRPr lang="en-US" dirty="0"/>
           </a:p>
         </p:txBody>
       </p:sp>
     </p:spTree>
     <p:extLst>
       <p:ext uri="{BB962C8B-B14F-4D97-AF65-F5344CB8AC3E}">
-        <p14:creationId xmlns:p14="http://schemas.microsoft.com/office/powerpoint/2010/main" val="3138754401"/>
+        <p14:creationId xmlns:p14="http://schemas.microsoft.com/office/powerpoint/2010/main" val="2586321980"/>
       </p:ext>
     </p:extLst>
   </p:cSld>
@@ -3660,7 +3544,7 @@
           <p:cNvPr id="2" name="Title 1">
             <a:extLst>
               <a:ext uri="{FF2B5EF4-FFF2-40B4-BE49-F238E27FC236}">
-                <a16:creationId xmlns:a16="http://schemas.microsoft.com/office/drawing/2014/main" id="{C8E38D7E-3005-49BF-92DD-F19DC4F1BE10}"/>
+                <a16:creationId xmlns:a16="http://schemas.microsoft.com/office/drawing/2014/main" id="{C93346C3-EEF5-4A41-8F4E-6784CB1F866C}"/>
               </a:ext>
             </a:extLst>
           </p:cNvPr>
@@ -3678,7 +3562,7 @@
           <a:p>
             <a:r>
               <a:rPr lang="en-US" dirty="0"/>
-              <a:t>Goals</a:t>
+              <a:t>Intellectual Merits</a:t>
             </a:r>
           </a:p>
         </p:txBody>
@@ -3688,7 +3572,7 @@
           <p:cNvPr id="3" name="Content Placeholder 2">
             <a:extLst>
               <a:ext uri="{FF2B5EF4-FFF2-40B4-BE49-F238E27FC236}">
-                <a16:creationId xmlns:a16="http://schemas.microsoft.com/office/drawing/2014/main" id="{03AF60F0-3856-472A-8196-091F6E9CD628}"/>
+                <a16:creationId xmlns:a16="http://schemas.microsoft.com/office/drawing/2014/main" id="{A31CC154-5E14-4FF0-B91D-77651616C741}"/>
               </a:ext>
             </a:extLst>
           </p:cNvPr>
@@ -3704,21 +3588,22 @@
           <a:bodyPr/>
           <a:lstStyle/>
           <a:p>
-            <a:pPr marL="0" indent="0">
-              <a:buNone/>
-            </a:pPr>
-            <a:r>
-              <a:rPr lang="en-US" dirty="0">
-                <a:ea typeface="+mn-lt"/>
-                <a:cs typeface="+mn-lt"/>
-              </a:rPr>
-              <a:t>Today’s youth have a hard time juggling many things going on including scheduling classes, assignments, activities, and social gatherings. We would like to make an application that makes this simple and easy.</a:t>
-            </a:r>
-          </a:p>
-          <a:p>
-            <a:endParaRPr lang="en-US" dirty="0">
-              <a:cs typeface="Calibri"/>
-            </a:endParaRPr>
+            <a:r>
+              <a:rPr lang="en-US" dirty="0"/>
+              <a:t>Dynamic Scheduling – Automatically plan certain events around a user’s existing schedule</a:t>
+            </a:r>
+          </a:p>
+          <a:p>
+            <a:r>
+              <a:rPr lang="en-US" dirty="0"/>
+              <a:t>Ability to view and attend public events</a:t>
+            </a:r>
+          </a:p>
+          <a:p>
+            <a:r>
+              <a:rPr lang="en-US" dirty="0"/>
+              <a:t>Ability to share events with friends</a:t>
+            </a:r>
           </a:p>
           <a:p>
             <a:endParaRPr lang="en-US" dirty="0"/>
@@ -3728,7 +3613,7 @@
     </p:spTree>
     <p:extLst>
       <p:ext uri="{BB962C8B-B14F-4D97-AF65-F5344CB8AC3E}">
-        <p14:creationId xmlns:p14="http://schemas.microsoft.com/office/powerpoint/2010/main" val="2586321980"/>
+        <p14:creationId xmlns:p14="http://schemas.microsoft.com/office/powerpoint/2010/main" val="1722184484"/>
       </p:ext>
     </p:extLst>
   </p:cSld>
@@ -3760,7 +3645,7 @@
           <p:cNvPr id="2" name="Title 1">
             <a:extLst>
               <a:ext uri="{FF2B5EF4-FFF2-40B4-BE49-F238E27FC236}">
-                <a16:creationId xmlns:a16="http://schemas.microsoft.com/office/drawing/2014/main" id="{C93346C3-EEF5-4A41-8F4E-6784CB1F866C}"/>
+                <a16:creationId xmlns:a16="http://schemas.microsoft.com/office/drawing/2014/main" id="{00864222-9EE5-4CA2-9C40-87BEE64C4608}"/>
               </a:ext>
             </a:extLst>
           </p:cNvPr>
@@ -3778,40 +3663,86 @@
           <a:p>
             <a:r>
               <a:rPr lang="en-US" dirty="0"/>
-              <a:t>Intellectual Merits</a:t>
-            </a:r>
-          </a:p>
-        </p:txBody>
-      </p:sp>
-      <p:sp>
-        <p:nvSpPr>
-          <p:cNvPr id="3" name="Content Placeholder 2">
-            <a:extLst>
-              <a:ext uri="{FF2B5EF4-FFF2-40B4-BE49-F238E27FC236}">
-                <a16:creationId xmlns:a16="http://schemas.microsoft.com/office/drawing/2014/main" id="{A31CC154-5E14-4FF0-B91D-77651616C741}"/>
-              </a:ext>
-            </a:extLst>
-          </p:cNvPr>
-          <p:cNvSpPr>
-            <a:spLocks noGrp="1"/>
-          </p:cNvSpPr>
+              <a:t>Design Specifications</a:t>
+            </a:r>
+          </a:p>
+        </p:txBody>
+      </p:sp>
+      <p:pic>
+        <p:nvPicPr>
+          <p:cNvPr id="6" name="Content Placeholder 5">
+            <a:extLst>
+              <a:ext uri="{FF2B5EF4-FFF2-40B4-BE49-F238E27FC236}">
+                <a16:creationId xmlns:a16="http://schemas.microsoft.com/office/drawing/2014/main" id="{C55FD86D-2AD6-4E5E-A2DC-9B094788F916}"/>
+              </a:ext>
+            </a:extLst>
+          </p:cNvPr>
+          <p:cNvPicPr>
+            <a:picLocks noGrp="1" noChangeAspect="1"/>
+          </p:cNvPicPr>
           <p:nvPr>
             <p:ph idx="1"/>
           </p:nvPr>
-        </p:nvSpPr>
-        <p:spPr/>
-        <p:txBody>
-          <a:bodyPr/>
-          <a:lstStyle/>
-          <a:p>
-            <a:endParaRPr lang="en-US"/>
-          </a:p>
-        </p:txBody>
-      </p:sp>
+        </p:nvPicPr>
+        <p:blipFill>
+          <a:blip r:embed="rId2">
+            <a:extLst>
+              <a:ext uri="{28A0092B-C50C-407E-A947-70E740481C1C}">
+                <a14:useLocalDpi xmlns:a14="http://schemas.microsoft.com/office/drawing/2010/main" val="0"/>
+              </a:ext>
+            </a:extLst>
+          </a:blip>
+          <a:stretch>
+            <a:fillRect/>
+          </a:stretch>
+        </p:blipFill>
+        <p:spPr>
+          <a:xfrm>
+            <a:off x="681278" y="1859492"/>
+            <a:ext cx="4022244" cy="4351338"/>
+          </a:xfrm>
+        </p:spPr>
+      </p:pic>
+      <p:pic>
+        <p:nvPicPr>
+          <p:cNvPr id="8" name="Picture 7">
+            <a:extLst>
+              <a:ext uri="{FF2B5EF4-FFF2-40B4-BE49-F238E27FC236}">
+                <a16:creationId xmlns:a16="http://schemas.microsoft.com/office/drawing/2014/main" id="{2CBFE332-4217-4227-B117-EBBF44405CE7}"/>
+              </a:ext>
+            </a:extLst>
+          </p:cNvPr>
+          <p:cNvPicPr>
+            <a:picLocks noChangeAspect="1"/>
+          </p:cNvPicPr>
+          <p:nvPr/>
+        </p:nvPicPr>
+        <p:blipFill>
+          <a:blip r:embed="rId3">
+            <a:extLst>
+              <a:ext uri="{28A0092B-C50C-407E-A947-70E740481C1C}">
+                <a14:useLocalDpi xmlns:a14="http://schemas.microsoft.com/office/drawing/2010/main" val="0"/>
+              </a:ext>
+            </a:extLst>
+          </a:blip>
+          <a:stretch>
+            <a:fillRect/>
+          </a:stretch>
+        </p:blipFill>
+        <p:spPr>
+          <a:xfrm>
+            <a:off x="5134339" y="1859492"/>
+            <a:ext cx="6219461" cy="3452159"/>
+          </a:xfrm>
+          <a:prstGeom prst="rect">
+            <a:avLst/>
+          </a:prstGeom>
+        </p:spPr>
+      </p:pic>
     </p:spTree>
     <p:extLst>
       <p:ext uri="{BB962C8B-B14F-4D97-AF65-F5344CB8AC3E}">
-        <p14:creationId xmlns:p14="http://schemas.microsoft.com/office/powerpoint/2010/main" val="1722184484"/>
+        <p14:creationId xmlns:p14="http://schemas.microsoft.com/office/powerpoint/2010/main" val="2224684890"/>
       </p:ext>
     </p:extLst>
   </p:cSld>
@@ -3843,7 +3774,7 @@
           <p:cNvPr id="2" name="Title 1">
             <a:extLst>
               <a:ext uri="{FF2B5EF4-FFF2-40B4-BE49-F238E27FC236}">
-                <a16:creationId xmlns:a16="http://schemas.microsoft.com/office/drawing/2014/main" id="{556B506A-8DCF-421C-A1BD-B6259C45CCD6}"/>
+                <a16:creationId xmlns:a16="http://schemas.microsoft.com/office/drawing/2014/main" id="{01AD6474-528B-48D7-A63F-92A5F11937B4}"/>
               </a:ext>
             </a:extLst>
           </p:cNvPr>
@@ -3861,40 +3792,134 @@
           <a:p>
             <a:r>
               <a:rPr lang="en-US" dirty="0"/>
-              <a:t>Broader Impacts</a:t>
-            </a:r>
-          </a:p>
-        </p:txBody>
-      </p:sp>
-      <p:sp>
-        <p:nvSpPr>
-          <p:cNvPr id="3" name="Content Placeholder 2">
-            <a:extLst>
-              <a:ext uri="{FF2B5EF4-FFF2-40B4-BE49-F238E27FC236}">
-                <a16:creationId xmlns:a16="http://schemas.microsoft.com/office/drawing/2014/main" id="{C19F1306-C1F2-4739-A840-51B05587F3B9}"/>
-              </a:ext>
-            </a:extLst>
-          </p:cNvPr>
-          <p:cNvSpPr>
-            <a:spLocks noGrp="1"/>
-          </p:cNvSpPr>
+              <a:t>Design Specifications</a:t>
+            </a:r>
+          </a:p>
+        </p:txBody>
+      </p:sp>
+      <p:pic>
+        <p:nvPicPr>
+          <p:cNvPr id="5" name="Content Placeholder 4">
+            <a:extLst>
+              <a:ext uri="{FF2B5EF4-FFF2-40B4-BE49-F238E27FC236}">
+                <a16:creationId xmlns:a16="http://schemas.microsoft.com/office/drawing/2014/main" id="{A1C42585-E2AA-4C3F-A4A3-090BDD14F4BB}"/>
+              </a:ext>
+            </a:extLst>
+          </p:cNvPr>
+          <p:cNvPicPr>
+            <a:picLocks noGrp="1" noChangeAspect="1"/>
+          </p:cNvPicPr>
           <p:nvPr>
             <p:ph idx="1"/>
           </p:nvPr>
-        </p:nvSpPr>
-        <p:spPr/>
-        <p:txBody>
-          <a:bodyPr/>
+        </p:nvPicPr>
+        <p:blipFill>
+          <a:blip r:embed="rId2">
+            <a:extLst>
+              <a:ext uri="{28A0092B-C50C-407E-A947-70E740481C1C}">
+                <a14:useLocalDpi xmlns:a14="http://schemas.microsoft.com/office/drawing/2010/main" val="0"/>
+              </a:ext>
+            </a:extLst>
+          </a:blip>
+          <a:stretch>
+            <a:fillRect/>
+          </a:stretch>
+        </p:blipFill>
+        <p:spPr>
+          <a:xfrm>
+            <a:off x="838200" y="1690688"/>
+            <a:ext cx="4476171" cy="4351338"/>
+          </a:xfrm>
+        </p:spPr>
+      </p:pic>
+      <p:sp>
+        <p:nvSpPr>
+          <p:cNvPr id="6" name="TextBox 5">
+            <a:extLst>
+              <a:ext uri="{FF2B5EF4-FFF2-40B4-BE49-F238E27FC236}">
+                <a16:creationId xmlns:a16="http://schemas.microsoft.com/office/drawing/2014/main" id="{4D5FAD2E-0121-4FEF-9C80-6493DD91C604}"/>
+              </a:ext>
+            </a:extLst>
+          </p:cNvPr>
+          <p:cNvSpPr txBox="1"/>
+          <p:nvPr/>
+        </p:nvSpPr>
+        <p:spPr>
+          <a:xfrm>
+            <a:off x="609600" y="1955185"/>
+            <a:ext cx="1295400" cy="461665"/>
+          </a:xfrm>
+          <a:prstGeom prst="rect">
+            <a:avLst/>
+          </a:prstGeom>
+          <a:noFill/>
+        </p:spPr>
+        <p:txBody>
+          <a:bodyPr wrap="square" rtlCol="0">
+            <a:spAutoFit/>
+          </a:bodyPr>
           <a:lstStyle/>
           <a:p>
-            <a:endParaRPr lang="en-US"/>
+            <a:r>
+              <a:rPr lang="en-US" sz="2400" dirty="0"/>
+              <a:t>D</a:t>
+            </a:r>
+          </a:p>
+        </p:txBody>
+      </p:sp>
+      <p:sp>
+        <p:nvSpPr>
+          <p:cNvPr id="9" name="TextBox 8">
+            <a:extLst>
+              <a:ext uri="{FF2B5EF4-FFF2-40B4-BE49-F238E27FC236}">
+                <a16:creationId xmlns:a16="http://schemas.microsoft.com/office/drawing/2014/main" id="{D41E932C-A8E6-42EE-82F4-3D4E3FBDC588}"/>
+              </a:ext>
+            </a:extLst>
+          </p:cNvPr>
+          <p:cNvSpPr txBox="1"/>
+          <p:nvPr/>
+        </p:nvSpPr>
+        <p:spPr>
+          <a:xfrm>
+            <a:off x="5638800" y="2164080"/>
+            <a:ext cx="5943600" cy="1200329"/>
+          </a:xfrm>
+          <a:prstGeom prst="rect">
+            <a:avLst/>
+          </a:prstGeom>
+          <a:noFill/>
+        </p:spPr>
+        <p:txBody>
+          <a:bodyPr wrap="square" rtlCol="0">
+            <a:spAutoFit/>
+          </a:bodyPr>
+          <a:lstStyle/>
+          <a:p>
+            <a:pPr marL="285750" indent="-285750">
+              <a:buFont typeface="Arial" panose="020B0604020202020204" pitchFamily="34" charset="0"/>
+              <a:buChar char="•"/>
+            </a:pPr>
+            <a:r>
+              <a:rPr lang="en-US" dirty="0"/>
+              <a:t>Our application consists of a React Front end, a Django server, and a Postgres database</a:t>
+            </a:r>
+          </a:p>
+          <a:p>
+            <a:pPr marL="285750" indent="-285750">
+              <a:buFont typeface="Arial" panose="020B0604020202020204" pitchFamily="34" charset="0"/>
+              <a:buChar char="•"/>
+            </a:pPr>
+            <a:r>
+              <a:rPr lang="en-US" dirty="0"/>
+              <a:t>The Django server, and Postgres are run in Docker containers that are deployed to AWS.</a:t>
+            </a:r>
           </a:p>
         </p:txBody>
       </p:sp>
     </p:spTree>
     <p:extLst>
       <p:ext uri="{BB962C8B-B14F-4D97-AF65-F5344CB8AC3E}">
-        <p14:creationId xmlns:p14="http://schemas.microsoft.com/office/powerpoint/2010/main" val="2366308847"/>
+        <p14:creationId xmlns:p14="http://schemas.microsoft.com/office/powerpoint/2010/main" val="1428541302"/>
       </p:ext>
     </p:extLst>
   </p:cSld>
@@ -3926,7 +3951,7 @@
           <p:cNvPr id="2" name="Title 1">
             <a:extLst>
               <a:ext uri="{FF2B5EF4-FFF2-40B4-BE49-F238E27FC236}">
-                <a16:creationId xmlns:a16="http://schemas.microsoft.com/office/drawing/2014/main" id="{00864222-9EE5-4CA2-9C40-87BEE64C4608}"/>
+                <a16:creationId xmlns:a16="http://schemas.microsoft.com/office/drawing/2014/main" id="{76DE16EA-7121-4BBF-A598-A1C6E9B74214}"/>
               </a:ext>
             </a:extLst>
           </p:cNvPr>
@@ -3944,7 +3969,7 @@
           <a:p>
             <a:r>
               <a:rPr lang="en-US" dirty="0"/>
-              <a:t>Design Specifications</a:t>
+              <a:t>Technologies</a:t>
             </a:r>
           </a:p>
         </p:txBody>
@@ -3954,7 +3979,7 @@
           <p:cNvPr id="3" name="Content Placeholder 2">
             <a:extLst>
               <a:ext uri="{FF2B5EF4-FFF2-40B4-BE49-F238E27FC236}">
-                <a16:creationId xmlns:a16="http://schemas.microsoft.com/office/drawing/2014/main" id="{B2F35D5B-648A-430E-8FA1-16E048BA9F9F}"/>
+                <a16:creationId xmlns:a16="http://schemas.microsoft.com/office/drawing/2014/main" id="{230AF3B0-312F-40DC-ADCD-5A72C8E4A970}"/>
               </a:ext>
             </a:extLst>
           </p:cNvPr>
@@ -3967,17 +3992,90 @@
         </p:nvSpPr>
         <p:spPr/>
         <p:txBody>
-          <a:bodyPr/>
+          <a:bodyPr>
+            <a:normAutofit lnSpcReduction="10000"/>
+          </a:bodyPr>
           <a:lstStyle/>
           <a:p>
-            <a:endParaRPr lang="en-US"/>
+            <a:r>
+              <a:rPr lang="en-US" dirty="0"/>
+              <a:t>Front End</a:t>
+            </a:r>
+          </a:p>
+          <a:p>
+            <a:pPr lvl="1"/>
+            <a:r>
+              <a:rPr lang="en-US" dirty="0"/>
+              <a:t>React – </a:t>
+            </a:r>
+          </a:p>
+          <a:p>
+            <a:pPr lvl="1"/>
+            <a:r>
+              <a:rPr lang="en-US" dirty="0"/>
+              <a:t>React Native Calendars - </a:t>
+            </a:r>
+          </a:p>
+          <a:p>
+            <a:r>
+              <a:rPr lang="en-US" dirty="0"/>
+              <a:t>Back End</a:t>
+            </a:r>
+          </a:p>
+          <a:p>
+            <a:pPr lvl="1"/>
+            <a:r>
+              <a:rPr lang="en-US" dirty="0"/>
+              <a:t>Django – The server for our application</a:t>
+            </a:r>
+          </a:p>
+          <a:p>
+            <a:pPr lvl="1"/>
+            <a:r>
+              <a:rPr lang="en-US" dirty="0"/>
+              <a:t>Django Rest Framework – Library used with Django to write API</a:t>
+            </a:r>
+          </a:p>
+          <a:p>
+            <a:pPr lvl="1"/>
+            <a:r>
+              <a:rPr lang="en-US" dirty="0"/>
+              <a:t>Docker – Used for easy deployment</a:t>
+            </a:r>
+          </a:p>
+          <a:p>
+            <a:pPr lvl="1"/>
+            <a:r>
+              <a:rPr lang="en-US" dirty="0"/>
+              <a:t>PostgreSQL – Database used for the application</a:t>
+            </a:r>
+          </a:p>
+          <a:p>
+            <a:r>
+              <a:rPr lang="en-US" dirty="0"/>
+              <a:t>Cloud</a:t>
+            </a:r>
+          </a:p>
+          <a:p>
+            <a:pPr lvl="1"/>
+            <a:r>
+              <a:rPr lang="en-US" dirty="0"/>
+              <a:t>AWS EC2 – Used to run our Django Server</a:t>
+            </a:r>
+          </a:p>
+          <a:p>
+            <a:pPr lvl="1"/>
+            <a:r>
+              <a:rPr lang="en-US" dirty="0"/>
+              <a:t>AWS RDS – Used to operate our Postgres Database</a:t>
+            </a:r>
           </a:p>
         </p:txBody>
       </p:sp>
     </p:spTree>
     <p:extLst>
       <p:ext uri="{BB962C8B-B14F-4D97-AF65-F5344CB8AC3E}">
-        <p14:creationId xmlns:p14="http://schemas.microsoft.com/office/powerpoint/2010/main" val="2224684890"/>
+        <p14:creationId xmlns:p14="http://schemas.microsoft.com/office/powerpoint/2010/main" val="327352126"/>
       </p:ext>
     </p:extLst>
   </p:cSld>
@@ -4009,7 +4107,7 @@
           <p:cNvPr id="2" name="Title 1">
             <a:extLst>
               <a:ext uri="{FF2B5EF4-FFF2-40B4-BE49-F238E27FC236}">
-                <a16:creationId xmlns:a16="http://schemas.microsoft.com/office/drawing/2014/main" id="{76DE16EA-7121-4BBF-A598-A1C6E9B74214}"/>
+                <a16:creationId xmlns:a16="http://schemas.microsoft.com/office/drawing/2014/main" id="{BA36E25D-88D7-4041-9EC7-90B735FC6C82}"/>
               </a:ext>
             </a:extLst>
           </p:cNvPr>
@@ -4026,42 +4124,1673 @@
           <a:lstStyle/>
           <a:p>
             <a:r>
-              <a:rPr lang="en-US" dirty="0" err="1"/>
-              <a:t>Techonologies</a:t>
-            </a:r>
-            <a:endParaRPr lang="en-US" dirty="0"/>
-          </a:p>
-        </p:txBody>
-      </p:sp>
-      <p:sp>
-        <p:nvSpPr>
-          <p:cNvPr id="3" name="Content Placeholder 2">
-            <a:extLst>
-              <a:ext uri="{FF2B5EF4-FFF2-40B4-BE49-F238E27FC236}">
-                <a16:creationId xmlns:a16="http://schemas.microsoft.com/office/drawing/2014/main" id="{230AF3B0-312F-40DC-ADCD-5A72C8E4A970}"/>
-              </a:ext>
-            </a:extLst>
-          </p:cNvPr>
-          <p:cNvSpPr>
-            <a:spLocks noGrp="1"/>
-          </p:cNvSpPr>
-          <p:nvPr>
-            <p:ph idx="1"/>
-          </p:nvPr>
-        </p:nvSpPr>
-        <p:spPr/>
-        <p:txBody>
-          <a:bodyPr/>
-          <a:lstStyle/>
-          <a:p>
-            <a:endParaRPr lang="en-US"/>
-          </a:p>
-        </p:txBody>
-      </p:sp>
+              <a:rPr lang="en-US" dirty="0"/>
+              <a:t>Milestones</a:t>
+            </a:r>
+          </a:p>
+        </p:txBody>
+      </p:sp>
+      <p:graphicFrame>
+        <p:nvGraphicFramePr>
+          <p:cNvPr id="4" name="Table 3">
+            <a:extLst>
+              <a:ext uri="{FF2B5EF4-FFF2-40B4-BE49-F238E27FC236}">
+                <a16:creationId xmlns:a16="http://schemas.microsoft.com/office/drawing/2014/main" id="{08B6A3F0-B225-43EE-BA98-926E0B64F4F9}"/>
+              </a:ext>
+            </a:extLst>
+          </p:cNvPr>
+          <p:cNvGraphicFramePr>
+            <a:graphicFrameLocks noGrp="1"/>
+          </p:cNvGraphicFramePr>
+          <p:nvPr>
+            <p:extLst>
+              <p:ext uri="{D42A27DB-BD31-4B8C-83A1-F6EECF244321}">
+                <p14:modId xmlns:p14="http://schemas.microsoft.com/office/powerpoint/2010/main" val="1173621326"/>
+              </p:ext>
+            </p:extLst>
+          </p:nvPr>
+        </p:nvGraphicFramePr>
+        <p:xfrm>
+          <a:off x="727042" y="1586443"/>
+          <a:ext cx="10737915" cy="4655888"/>
+        </p:xfrm>
+        <a:graphic>
+          <a:graphicData uri="http://schemas.openxmlformats.org/drawingml/2006/table">
+            <a:tbl>
+              <a:tblPr firstRow="1" firstCol="1" bandRow="1">
+                <a:tableStyleId>{5C22544A-7EE6-4342-B048-85BDC9FD1C3A}</a:tableStyleId>
+              </a:tblPr>
+              <a:tblGrid>
+                <a:gridCol w="4076962">
+                  <a:extLst>
+                    <a:ext uri="{9D8B030D-6E8A-4147-A177-3AD203B41FA5}">
+                      <a16:colId xmlns:a16="http://schemas.microsoft.com/office/drawing/2014/main" val="268937018"/>
+                    </a:ext>
+                  </a:extLst>
+                </a:gridCol>
+                <a:gridCol w="3683048">
+                  <a:extLst>
+                    <a:ext uri="{9D8B030D-6E8A-4147-A177-3AD203B41FA5}">
+                      <a16:colId xmlns:a16="http://schemas.microsoft.com/office/drawing/2014/main" val="3127813479"/>
+                    </a:ext>
+                  </a:extLst>
+                </a:gridCol>
+                <a:gridCol w="2977905">
+                  <a:extLst>
+                    <a:ext uri="{9D8B030D-6E8A-4147-A177-3AD203B41FA5}">
+                      <a16:colId xmlns:a16="http://schemas.microsoft.com/office/drawing/2014/main" val="1066900068"/>
+                    </a:ext>
+                  </a:extLst>
+                </a:gridCol>
+              </a:tblGrid>
+              <a:tr h="290993">
+                <a:tc>
+                  <a:txBody>
+                    <a:bodyPr/>
+                    <a:lstStyle/>
+                    <a:p>
+                      <a:pPr marL="0" marR="0">
+                        <a:lnSpc>
+                          <a:spcPct val="107000"/>
+                        </a:lnSpc>
+                        <a:spcBef>
+                          <a:spcPts val="0"/>
+                        </a:spcBef>
+                        <a:spcAft>
+                          <a:spcPts val="0"/>
+                        </a:spcAft>
+                      </a:pPr>
+                      <a:r>
+                        <a:rPr lang="en-US" sz="1200" dirty="0">
+                          <a:effectLst/>
+                        </a:rPr>
+                        <a:t>Tasks/Milestones</a:t>
+                      </a:r>
+                      <a:endParaRPr lang="en-US" sz="1200" dirty="0">
+                        <a:effectLst/>
+                        <a:latin typeface="Times New Roman" panose="02020603050405020304" pitchFamily="18" charset="0"/>
+                        <a:ea typeface="Calibri" panose="020F0502020204030204" pitchFamily="34" charset="0"/>
+                      </a:endParaRPr>
+                    </a:p>
+                  </a:txBody>
+                  <a:tcPr marL="68580" marR="68580" marT="0" marB="0"/>
+                </a:tc>
+                <a:tc>
+                  <a:txBody>
+                    <a:bodyPr/>
+                    <a:lstStyle/>
+                    <a:p>
+                      <a:pPr marL="0" marR="0">
+                        <a:lnSpc>
+                          <a:spcPct val="107000"/>
+                        </a:lnSpc>
+                        <a:spcBef>
+                          <a:spcPts val="0"/>
+                        </a:spcBef>
+                        <a:spcAft>
+                          <a:spcPts val="0"/>
+                        </a:spcAft>
+                      </a:pPr>
+                      <a:r>
+                        <a:rPr lang="en-US" sz="1200" dirty="0">
+                          <a:effectLst/>
+                        </a:rPr>
+                        <a:t>Start Date</a:t>
+                      </a:r>
+                      <a:endParaRPr lang="en-US" sz="1200" dirty="0">
+                        <a:effectLst/>
+                        <a:latin typeface="Times New Roman" panose="02020603050405020304" pitchFamily="18" charset="0"/>
+                        <a:ea typeface="Calibri" panose="020F0502020204030204" pitchFamily="34" charset="0"/>
+                      </a:endParaRPr>
+                    </a:p>
+                  </a:txBody>
+                  <a:tcPr marL="68580" marR="68580" marT="0" marB="0"/>
+                </a:tc>
+                <a:tc>
+                  <a:txBody>
+                    <a:bodyPr/>
+                    <a:lstStyle/>
+                    <a:p>
+                      <a:pPr marL="0" marR="0">
+                        <a:lnSpc>
+                          <a:spcPct val="107000"/>
+                        </a:lnSpc>
+                        <a:spcBef>
+                          <a:spcPts val="0"/>
+                        </a:spcBef>
+                        <a:spcAft>
+                          <a:spcPts val="0"/>
+                        </a:spcAft>
+                      </a:pPr>
+                      <a:r>
+                        <a:rPr lang="en-US" sz="1200" dirty="0">
+                          <a:effectLst/>
+                        </a:rPr>
+                        <a:t>Completion Date</a:t>
+                      </a:r>
+                      <a:endParaRPr lang="en-US" sz="1200" dirty="0">
+                        <a:effectLst/>
+                        <a:latin typeface="Times New Roman" panose="02020603050405020304" pitchFamily="18" charset="0"/>
+                        <a:ea typeface="Calibri" panose="020F0502020204030204" pitchFamily="34" charset="0"/>
+                      </a:endParaRPr>
+                    </a:p>
+                  </a:txBody>
+                  <a:tcPr marL="68580" marR="68580" marT="0" marB="0"/>
+                </a:tc>
+                <a:extLst>
+                  <a:ext uri="{0D108BD9-81ED-4DB2-BD59-A6C34878D82A}">
+                    <a16:rowId xmlns:a16="http://schemas.microsoft.com/office/drawing/2014/main" val="1594522874"/>
+                  </a:ext>
+                </a:extLst>
+              </a:tr>
+              <a:tr h="290993">
+                <a:tc>
+                  <a:txBody>
+                    <a:bodyPr/>
+                    <a:lstStyle/>
+                    <a:p>
+                      <a:pPr marL="0" marR="0">
+                        <a:lnSpc>
+                          <a:spcPct val="107000"/>
+                        </a:lnSpc>
+                        <a:spcBef>
+                          <a:spcPts val="0"/>
+                        </a:spcBef>
+                        <a:spcAft>
+                          <a:spcPts val="0"/>
+                        </a:spcAft>
+                      </a:pPr>
+                      <a:r>
+                        <a:rPr lang="en-US" sz="1200" b="1" dirty="0">
+                          <a:effectLst/>
+                        </a:rPr>
+                        <a:t>Get back end running</a:t>
+                      </a:r>
+                      <a:endParaRPr lang="en-US" sz="1200" b="1" dirty="0">
+                        <a:effectLst/>
+                        <a:latin typeface="Times New Roman" panose="02020603050405020304" pitchFamily="18" charset="0"/>
+                        <a:ea typeface="Calibri" panose="020F0502020204030204" pitchFamily="34" charset="0"/>
+                      </a:endParaRPr>
+                    </a:p>
+                  </a:txBody>
+                  <a:tcPr marL="68580" marR="68580" marT="0" marB="0"/>
+                </a:tc>
+                <a:tc>
+                  <a:txBody>
+                    <a:bodyPr/>
+                    <a:lstStyle/>
+                    <a:p>
+                      <a:pPr marL="0" marR="0" algn="ctr">
+                        <a:lnSpc>
+                          <a:spcPct val="107000"/>
+                        </a:lnSpc>
+                        <a:spcBef>
+                          <a:spcPts val="0"/>
+                        </a:spcBef>
+                        <a:spcAft>
+                          <a:spcPts val="0"/>
+                        </a:spcAft>
+                      </a:pPr>
+                      <a:r>
+                        <a:rPr lang="en-US" sz="1200" b="1" dirty="0">
+                          <a:effectLst/>
+                        </a:rPr>
+                        <a:t>11/1/19</a:t>
+                      </a:r>
+                      <a:endParaRPr lang="en-US" sz="1200" b="1" dirty="0">
+                        <a:effectLst/>
+                        <a:latin typeface="Times New Roman" panose="02020603050405020304" pitchFamily="18" charset="0"/>
+                        <a:ea typeface="Calibri" panose="020F0502020204030204" pitchFamily="34" charset="0"/>
+                      </a:endParaRPr>
+                    </a:p>
+                  </a:txBody>
+                  <a:tcPr marL="68580" marR="68580" marT="0" marB="0"/>
+                </a:tc>
+                <a:tc>
+                  <a:txBody>
+                    <a:bodyPr/>
+                    <a:lstStyle/>
+                    <a:p>
+                      <a:pPr marL="0" marR="0" algn="ctr">
+                        <a:lnSpc>
+                          <a:spcPct val="107000"/>
+                        </a:lnSpc>
+                        <a:spcBef>
+                          <a:spcPts val="0"/>
+                        </a:spcBef>
+                        <a:spcAft>
+                          <a:spcPts val="0"/>
+                        </a:spcAft>
+                      </a:pPr>
+                      <a:r>
+                        <a:rPr lang="en-US" sz="1200" b="1" dirty="0">
+                          <a:effectLst/>
+                        </a:rPr>
+                        <a:t>11/24/19</a:t>
+                      </a:r>
+                      <a:endParaRPr lang="en-US" sz="1200" b="1" dirty="0">
+                        <a:effectLst/>
+                        <a:latin typeface="Times New Roman" panose="02020603050405020304" pitchFamily="18" charset="0"/>
+                        <a:ea typeface="Calibri" panose="020F0502020204030204" pitchFamily="34" charset="0"/>
+                      </a:endParaRPr>
+                    </a:p>
+                  </a:txBody>
+                  <a:tcPr marL="68580" marR="68580" marT="0" marB="0"/>
+                </a:tc>
+                <a:extLst>
+                  <a:ext uri="{0D108BD9-81ED-4DB2-BD59-A6C34878D82A}">
+                    <a16:rowId xmlns:a16="http://schemas.microsoft.com/office/drawing/2014/main" val="860415944"/>
+                  </a:ext>
+                </a:extLst>
+              </a:tr>
+              <a:tr h="290993">
+                <a:tc>
+                  <a:txBody>
+                    <a:bodyPr/>
+                    <a:lstStyle/>
+                    <a:p>
+                      <a:pPr marL="0" marR="0">
+                        <a:lnSpc>
+                          <a:spcPct val="107000"/>
+                        </a:lnSpc>
+                        <a:spcBef>
+                          <a:spcPts val="0"/>
+                        </a:spcBef>
+                        <a:spcAft>
+                          <a:spcPts val="0"/>
+                        </a:spcAft>
+                      </a:pPr>
+                      <a:r>
+                        <a:rPr lang="en-US" sz="1200" b="1" dirty="0">
+                          <a:effectLst/>
+                        </a:rPr>
+                        <a:t>Rough UI</a:t>
+                      </a:r>
+                      <a:endParaRPr lang="en-US" sz="1200" b="1" dirty="0">
+                        <a:effectLst/>
+                        <a:latin typeface="Times New Roman" panose="02020603050405020304" pitchFamily="18" charset="0"/>
+                        <a:ea typeface="Calibri" panose="020F0502020204030204" pitchFamily="34" charset="0"/>
+                      </a:endParaRPr>
+                    </a:p>
+                  </a:txBody>
+                  <a:tcPr marL="68580" marR="68580" marT="0" marB="0"/>
+                </a:tc>
+                <a:tc>
+                  <a:txBody>
+                    <a:bodyPr/>
+                    <a:lstStyle/>
+                    <a:p>
+                      <a:pPr marL="0" marR="0" algn="ctr">
+                        <a:lnSpc>
+                          <a:spcPct val="107000"/>
+                        </a:lnSpc>
+                        <a:spcBef>
+                          <a:spcPts val="0"/>
+                        </a:spcBef>
+                        <a:spcAft>
+                          <a:spcPts val="0"/>
+                        </a:spcAft>
+                      </a:pPr>
+                      <a:r>
+                        <a:rPr lang="en-US" sz="1200" b="1" dirty="0">
+                          <a:effectLst/>
+                        </a:rPr>
+                        <a:t>11/1/19</a:t>
+                      </a:r>
+                      <a:endParaRPr lang="en-US" sz="1200" b="1" dirty="0">
+                        <a:effectLst/>
+                        <a:latin typeface="Times New Roman" panose="02020603050405020304" pitchFamily="18" charset="0"/>
+                        <a:ea typeface="Calibri" panose="020F0502020204030204" pitchFamily="34" charset="0"/>
+                      </a:endParaRPr>
+                    </a:p>
+                  </a:txBody>
+                  <a:tcPr marL="68580" marR="68580" marT="0" marB="0"/>
+                </a:tc>
+                <a:tc>
+                  <a:txBody>
+                    <a:bodyPr/>
+                    <a:lstStyle/>
+                    <a:p>
+                      <a:pPr marL="0" marR="0" algn="ctr">
+                        <a:lnSpc>
+                          <a:spcPct val="107000"/>
+                        </a:lnSpc>
+                        <a:spcBef>
+                          <a:spcPts val="0"/>
+                        </a:spcBef>
+                        <a:spcAft>
+                          <a:spcPts val="0"/>
+                        </a:spcAft>
+                      </a:pPr>
+                      <a:r>
+                        <a:rPr lang="en-US" sz="1200" b="1" dirty="0">
+                          <a:effectLst/>
+                        </a:rPr>
+                        <a:t>12/6/19</a:t>
+                      </a:r>
+                      <a:endParaRPr lang="en-US" sz="1200" b="1" dirty="0">
+                        <a:effectLst/>
+                        <a:latin typeface="Times New Roman" panose="02020603050405020304" pitchFamily="18" charset="0"/>
+                        <a:ea typeface="Calibri" panose="020F0502020204030204" pitchFamily="34" charset="0"/>
+                      </a:endParaRPr>
+                    </a:p>
+                  </a:txBody>
+                  <a:tcPr marL="68580" marR="68580" marT="0" marB="0"/>
+                </a:tc>
+                <a:extLst>
+                  <a:ext uri="{0D108BD9-81ED-4DB2-BD59-A6C34878D82A}">
+                    <a16:rowId xmlns:a16="http://schemas.microsoft.com/office/drawing/2014/main" val="1712566001"/>
+                  </a:ext>
+                </a:extLst>
+              </a:tr>
+              <a:tr h="290993">
+                <a:tc>
+                  <a:txBody>
+                    <a:bodyPr/>
+                    <a:lstStyle/>
+                    <a:p>
+                      <a:pPr marL="0" marR="0">
+                        <a:lnSpc>
+                          <a:spcPct val="107000"/>
+                        </a:lnSpc>
+                        <a:spcBef>
+                          <a:spcPts val="0"/>
+                        </a:spcBef>
+                        <a:spcAft>
+                          <a:spcPts val="0"/>
+                        </a:spcAft>
+                      </a:pPr>
+                      <a:r>
+                        <a:rPr lang="en-US" sz="1200" b="1" dirty="0">
+                          <a:effectLst/>
+                        </a:rPr>
+                        <a:t>Rough UX</a:t>
+                      </a:r>
+                      <a:endParaRPr lang="en-US" sz="1200" b="1" dirty="0">
+                        <a:effectLst/>
+                        <a:latin typeface="Times New Roman" panose="02020603050405020304" pitchFamily="18" charset="0"/>
+                        <a:ea typeface="Calibri" panose="020F0502020204030204" pitchFamily="34" charset="0"/>
+                      </a:endParaRPr>
+                    </a:p>
+                  </a:txBody>
+                  <a:tcPr marL="68580" marR="68580" marT="0" marB="0"/>
+                </a:tc>
+                <a:tc>
+                  <a:txBody>
+                    <a:bodyPr/>
+                    <a:lstStyle/>
+                    <a:p>
+                      <a:pPr marL="0" marR="0" algn="ctr">
+                        <a:lnSpc>
+                          <a:spcPct val="107000"/>
+                        </a:lnSpc>
+                        <a:spcBef>
+                          <a:spcPts val="0"/>
+                        </a:spcBef>
+                        <a:spcAft>
+                          <a:spcPts val="0"/>
+                        </a:spcAft>
+                      </a:pPr>
+                      <a:r>
+                        <a:rPr lang="en-US" sz="1200" b="1" dirty="0">
+                          <a:effectLst/>
+                        </a:rPr>
+                        <a:t>12/6/19</a:t>
+                      </a:r>
+                      <a:endParaRPr lang="en-US" sz="1200" b="1" dirty="0">
+                        <a:effectLst/>
+                        <a:latin typeface="Times New Roman" panose="02020603050405020304" pitchFamily="18" charset="0"/>
+                        <a:ea typeface="Calibri" panose="020F0502020204030204" pitchFamily="34" charset="0"/>
+                      </a:endParaRPr>
+                    </a:p>
+                  </a:txBody>
+                  <a:tcPr marL="68580" marR="68580" marT="0" marB="0"/>
+                </a:tc>
+                <a:tc>
+                  <a:txBody>
+                    <a:bodyPr/>
+                    <a:lstStyle/>
+                    <a:p>
+                      <a:pPr marL="0" marR="0" algn="ctr">
+                        <a:lnSpc>
+                          <a:spcPct val="107000"/>
+                        </a:lnSpc>
+                        <a:spcBef>
+                          <a:spcPts val="0"/>
+                        </a:spcBef>
+                        <a:spcAft>
+                          <a:spcPts val="0"/>
+                        </a:spcAft>
+                      </a:pPr>
+                      <a:r>
+                        <a:rPr lang="en-US" sz="1200" b="1" dirty="0">
+                          <a:effectLst/>
+                        </a:rPr>
+                        <a:t>12/25/19</a:t>
+                      </a:r>
+                      <a:endParaRPr lang="en-US" sz="1200" b="1" dirty="0">
+                        <a:effectLst/>
+                        <a:latin typeface="Times New Roman" panose="02020603050405020304" pitchFamily="18" charset="0"/>
+                        <a:ea typeface="Calibri" panose="020F0502020204030204" pitchFamily="34" charset="0"/>
+                      </a:endParaRPr>
+                    </a:p>
+                  </a:txBody>
+                  <a:tcPr marL="68580" marR="68580" marT="0" marB="0"/>
+                </a:tc>
+                <a:extLst>
+                  <a:ext uri="{0D108BD9-81ED-4DB2-BD59-A6C34878D82A}">
+                    <a16:rowId xmlns:a16="http://schemas.microsoft.com/office/drawing/2014/main" val="3237529596"/>
+                  </a:ext>
+                </a:extLst>
+              </a:tr>
+              <a:tr h="290993">
+                <a:tc>
+                  <a:txBody>
+                    <a:bodyPr/>
+                    <a:lstStyle/>
+                    <a:p>
+                      <a:pPr marL="0" marR="0">
+                        <a:lnSpc>
+                          <a:spcPct val="107000"/>
+                        </a:lnSpc>
+                        <a:spcBef>
+                          <a:spcPts val="0"/>
+                        </a:spcBef>
+                        <a:spcAft>
+                          <a:spcPts val="0"/>
+                        </a:spcAft>
+                      </a:pPr>
+                      <a:r>
+                        <a:rPr lang="en-US" sz="1200" dirty="0">
+                          <a:effectLst/>
+                        </a:rPr>
+                        <a:t>Custom Users</a:t>
+                      </a:r>
+                      <a:endParaRPr lang="en-US" sz="1200" dirty="0">
+                        <a:effectLst/>
+                        <a:latin typeface="Times New Roman" panose="02020603050405020304" pitchFamily="18" charset="0"/>
+                        <a:ea typeface="Calibri" panose="020F0502020204030204" pitchFamily="34" charset="0"/>
+                      </a:endParaRPr>
+                    </a:p>
+                  </a:txBody>
+                  <a:tcPr marL="68580" marR="68580" marT="0" marB="0"/>
+                </a:tc>
+                <a:tc>
+                  <a:txBody>
+                    <a:bodyPr/>
+                    <a:lstStyle/>
+                    <a:p>
+                      <a:pPr marL="0" marR="0" algn="ctr">
+                        <a:lnSpc>
+                          <a:spcPct val="107000"/>
+                        </a:lnSpc>
+                        <a:spcBef>
+                          <a:spcPts val="0"/>
+                        </a:spcBef>
+                        <a:spcAft>
+                          <a:spcPts val="0"/>
+                        </a:spcAft>
+                      </a:pPr>
+                      <a:r>
+                        <a:rPr lang="en-US" sz="1200" dirty="0">
+                          <a:effectLst/>
+                        </a:rPr>
+                        <a:t>11/24/19</a:t>
+                      </a:r>
+                      <a:endParaRPr lang="en-US" sz="1200" dirty="0">
+                        <a:effectLst/>
+                        <a:latin typeface="Times New Roman" panose="02020603050405020304" pitchFamily="18" charset="0"/>
+                        <a:ea typeface="Calibri" panose="020F0502020204030204" pitchFamily="34" charset="0"/>
+                      </a:endParaRPr>
+                    </a:p>
+                  </a:txBody>
+                  <a:tcPr marL="68580" marR="68580" marT="0" marB="0"/>
+                </a:tc>
+                <a:tc>
+                  <a:txBody>
+                    <a:bodyPr/>
+                    <a:lstStyle/>
+                    <a:p>
+                      <a:pPr marL="0" marR="0" algn="ctr">
+                        <a:lnSpc>
+                          <a:spcPct val="107000"/>
+                        </a:lnSpc>
+                        <a:spcBef>
+                          <a:spcPts val="0"/>
+                        </a:spcBef>
+                        <a:spcAft>
+                          <a:spcPts val="0"/>
+                        </a:spcAft>
+                      </a:pPr>
+                      <a:r>
+                        <a:rPr lang="en-US" sz="1200" dirty="0">
+                          <a:effectLst/>
+                        </a:rPr>
+                        <a:t>12/6/19</a:t>
+                      </a:r>
+                      <a:endParaRPr lang="en-US" sz="1200" dirty="0">
+                        <a:effectLst/>
+                        <a:latin typeface="Times New Roman" panose="02020603050405020304" pitchFamily="18" charset="0"/>
+                        <a:ea typeface="Calibri" panose="020F0502020204030204" pitchFamily="34" charset="0"/>
+                      </a:endParaRPr>
+                    </a:p>
+                  </a:txBody>
+                  <a:tcPr marL="68580" marR="68580" marT="0" marB="0"/>
+                </a:tc>
+                <a:extLst>
+                  <a:ext uri="{0D108BD9-81ED-4DB2-BD59-A6C34878D82A}">
+                    <a16:rowId xmlns:a16="http://schemas.microsoft.com/office/drawing/2014/main" val="2360337238"/>
+                  </a:ext>
+                </a:extLst>
+              </a:tr>
+              <a:tr h="290993">
+                <a:tc>
+                  <a:txBody>
+                    <a:bodyPr/>
+                    <a:lstStyle/>
+                    <a:p>
+                      <a:pPr marL="0" marR="0">
+                        <a:lnSpc>
+                          <a:spcPct val="107000"/>
+                        </a:lnSpc>
+                        <a:spcBef>
+                          <a:spcPts val="0"/>
+                        </a:spcBef>
+                        <a:spcAft>
+                          <a:spcPts val="0"/>
+                        </a:spcAft>
+                      </a:pPr>
+                      <a:r>
+                        <a:rPr lang="en-US" sz="1200" b="1" dirty="0">
+                          <a:effectLst/>
+                        </a:rPr>
+                        <a:t>API Planning</a:t>
+                      </a:r>
+                      <a:endParaRPr lang="en-US" sz="1200" b="1" dirty="0">
+                        <a:effectLst/>
+                        <a:latin typeface="Times New Roman" panose="02020603050405020304" pitchFamily="18" charset="0"/>
+                        <a:ea typeface="Calibri" panose="020F0502020204030204" pitchFamily="34" charset="0"/>
+                      </a:endParaRPr>
+                    </a:p>
+                  </a:txBody>
+                  <a:tcPr marL="68580" marR="68580" marT="0" marB="0"/>
+                </a:tc>
+                <a:tc>
+                  <a:txBody>
+                    <a:bodyPr/>
+                    <a:lstStyle/>
+                    <a:p>
+                      <a:pPr marL="0" marR="0" algn="ctr">
+                        <a:lnSpc>
+                          <a:spcPct val="107000"/>
+                        </a:lnSpc>
+                        <a:spcBef>
+                          <a:spcPts val="0"/>
+                        </a:spcBef>
+                        <a:spcAft>
+                          <a:spcPts val="0"/>
+                        </a:spcAft>
+                      </a:pPr>
+                      <a:r>
+                        <a:rPr lang="en-US" sz="1200" b="1" dirty="0">
+                          <a:effectLst/>
+                        </a:rPr>
+                        <a:t>12/6/19</a:t>
+                      </a:r>
+                      <a:endParaRPr lang="en-US" sz="1200" b="1" dirty="0">
+                        <a:effectLst/>
+                        <a:latin typeface="Times New Roman" panose="02020603050405020304" pitchFamily="18" charset="0"/>
+                        <a:ea typeface="Calibri" panose="020F0502020204030204" pitchFamily="34" charset="0"/>
+                      </a:endParaRPr>
+                    </a:p>
+                  </a:txBody>
+                  <a:tcPr marL="68580" marR="68580" marT="0" marB="0"/>
+                </a:tc>
+                <a:tc>
+                  <a:txBody>
+                    <a:bodyPr/>
+                    <a:lstStyle/>
+                    <a:p>
+                      <a:pPr marL="0" marR="0" algn="ctr">
+                        <a:lnSpc>
+                          <a:spcPct val="107000"/>
+                        </a:lnSpc>
+                        <a:spcBef>
+                          <a:spcPts val="0"/>
+                        </a:spcBef>
+                        <a:spcAft>
+                          <a:spcPts val="0"/>
+                        </a:spcAft>
+                      </a:pPr>
+                      <a:r>
+                        <a:rPr lang="en-US" sz="1200" b="1" dirty="0">
+                          <a:effectLst/>
+                        </a:rPr>
+                        <a:t>12/25/19</a:t>
+                      </a:r>
+                      <a:endParaRPr lang="en-US" sz="1200" b="1" dirty="0">
+                        <a:effectLst/>
+                        <a:latin typeface="Times New Roman" panose="02020603050405020304" pitchFamily="18" charset="0"/>
+                        <a:ea typeface="Calibri" panose="020F0502020204030204" pitchFamily="34" charset="0"/>
+                      </a:endParaRPr>
+                    </a:p>
+                  </a:txBody>
+                  <a:tcPr marL="68580" marR="68580" marT="0" marB="0"/>
+                </a:tc>
+                <a:extLst>
+                  <a:ext uri="{0D108BD9-81ED-4DB2-BD59-A6C34878D82A}">
+                    <a16:rowId xmlns:a16="http://schemas.microsoft.com/office/drawing/2014/main" val="2779981753"/>
+                  </a:ext>
+                </a:extLst>
+              </a:tr>
+              <a:tr h="290993">
+                <a:tc>
+                  <a:txBody>
+                    <a:bodyPr/>
+                    <a:lstStyle/>
+                    <a:p>
+                      <a:pPr marL="0" marR="0">
+                        <a:lnSpc>
+                          <a:spcPct val="107000"/>
+                        </a:lnSpc>
+                        <a:spcBef>
+                          <a:spcPts val="0"/>
+                        </a:spcBef>
+                        <a:spcAft>
+                          <a:spcPts val="0"/>
+                        </a:spcAft>
+                      </a:pPr>
+                      <a:r>
+                        <a:rPr lang="en-US" sz="1200" b="1" dirty="0">
+                          <a:effectLst/>
+                        </a:rPr>
+                        <a:t>Hookup front end to back end</a:t>
+                      </a:r>
+                      <a:endParaRPr lang="en-US" sz="1200" b="1" dirty="0">
+                        <a:effectLst/>
+                        <a:latin typeface="Times New Roman" panose="02020603050405020304" pitchFamily="18" charset="0"/>
+                        <a:ea typeface="Calibri" panose="020F0502020204030204" pitchFamily="34" charset="0"/>
+                      </a:endParaRPr>
+                    </a:p>
+                  </a:txBody>
+                  <a:tcPr marL="68580" marR="68580" marT="0" marB="0"/>
+                </a:tc>
+                <a:tc>
+                  <a:txBody>
+                    <a:bodyPr/>
+                    <a:lstStyle/>
+                    <a:p>
+                      <a:pPr marL="0" marR="0" algn="ctr">
+                        <a:lnSpc>
+                          <a:spcPct val="107000"/>
+                        </a:lnSpc>
+                        <a:spcBef>
+                          <a:spcPts val="0"/>
+                        </a:spcBef>
+                        <a:spcAft>
+                          <a:spcPts val="0"/>
+                        </a:spcAft>
+                      </a:pPr>
+                      <a:r>
+                        <a:rPr lang="en-US" sz="1200" b="1" dirty="0">
+                          <a:effectLst/>
+                        </a:rPr>
+                        <a:t>12/25/19</a:t>
+                      </a:r>
+                      <a:endParaRPr lang="en-US" sz="1200" b="1" dirty="0">
+                        <a:effectLst/>
+                        <a:latin typeface="Times New Roman" panose="02020603050405020304" pitchFamily="18" charset="0"/>
+                        <a:ea typeface="Calibri" panose="020F0502020204030204" pitchFamily="34" charset="0"/>
+                      </a:endParaRPr>
+                    </a:p>
+                  </a:txBody>
+                  <a:tcPr marL="68580" marR="68580" marT="0" marB="0"/>
+                </a:tc>
+                <a:tc>
+                  <a:txBody>
+                    <a:bodyPr/>
+                    <a:lstStyle/>
+                    <a:p>
+                      <a:pPr marL="0" marR="0" algn="ctr">
+                        <a:lnSpc>
+                          <a:spcPct val="107000"/>
+                        </a:lnSpc>
+                        <a:spcBef>
+                          <a:spcPts val="0"/>
+                        </a:spcBef>
+                        <a:spcAft>
+                          <a:spcPts val="0"/>
+                        </a:spcAft>
+                      </a:pPr>
+                      <a:r>
+                        <a:rPr lang="en-US" sz="1200" b="1" dirty="0">
+                          <a:effectLst/>
+                        </a:rPr>
+                        <a:t>1/13/20</a:t>
+                      </a:r>
+                      <a:endParaRPr lang="en-US" sz="1200" b="1" dirty="0">
+                        <a:effectLst/>
+                        <a:latin typeface="Times New Roman" panose="02020603050405020304" pitchFamily="18" charset="0"/>
+                        <a:ea typeface="Calibri" panose="020F0502020204030204" pitchFamily="34" charset="0"/>
+                      </a:endParaRPr>
+                    </a:p>
+                  </a:txBody>
+                  <a:tcPr marL="68580" marR="68580" marT="0" marB="0"/>
+                </a:tc>
+                <a:extLst>
+                  <a:ext uri="{0D108BD9-81ED-4DB2-BD59-A6C34878D82A}">
+                    <a16:rowId xmlns:a16="http://schemas.microsoft.com/office/drawing/2014/main" val="2002274117"/>
+                  </a:ext>
+                </a:extLst>
+              </a:tr>
+              <a:tr h="290993">
+                <a:tc>
+                  <a:txBody>
+                    <a:bodyPr/>
+                    <a:lstStyle/>
+                    <a:p>
+                      <a:pPr marL="0" marR="0">
+                        <a:lnSpc>
+                          <a:spcPct val="107000"/>
+                        </a:lnSpc>
+                        <a:spcBef>
+                          <a:spcPts val="0"/>
+                        </a:spcBef>
+                        <a:spcAft>
+                          <a:spcPts val="0"/>
+                        </a:spcAft>
+                      </a:pPr>
+                      <a:r>
+                        <a:rPr lang="en-US" sz="1200" dirty="0">
+                          <a:effectLst/>
+                        </a:rPr>
+                        <a:t>Scheduling Algorithm</a:t>
+                      </a:r>
+                      <a:endParaRPr lang="en-US" sz="1200" dirty="0">
+                        <a:effectLst/>
+                        <a:latin typeface="Times New Roman" panose="02020603050405020304" pitchFamily="18" charset="0"/>
+                        <a:ea typeface="Calibri" panose="020F0502020204030204" pitchFamily="34" charset="0"/>
+                      </a:endParaRPr>
+                    </a:p>
+                  </a:txBody>
+                  <a:tcPr marL="68580" marR="68580" marT="0" marB="0"/>
+                </a:tc>
+                <a:tc>
+                  <a:txBody>
+                    <a:bodyPr/>
+                    <a:lstStyle/>
+                    <a:p>
+                      <a:pPr marL="0" marR="0" algn="ctr">
+                        <a:lnSpc>
+                          <a:spcPct val="107000"/>
+                        </a:lnSpc>
+                        <a:spcBef>
+                          <a:spcPts val="0"/>
+                        </a:spcBef>
+                        <a:spcAft>
+                          <a:spcPts val="0"/>
+                        </a:spcAft>
+                      </a:pPr>
+                      <a:r>
+                        <a:rPr lang="en-US" sz="1200" dirty="0">
+                          <a:effectLst/>
+                        </a:rPr>
+                        <a:t>12/25/19</a:t>
+                      </a:r>
+                      <a:endParaRPr lang="en-US" sz="1200" dirty="0">
+                        <a:effectLst/>
+                        <a:latin typeface="Times New Roman" panose="02020603050405020304" pitchFamily="18" charset="0"/>
+                        <a:ea typeface="Calibri" panose="020F0502020204030204" pitchFamily="34" charset="0"/>
+                      </a:endParaRPr>
+                    </a:p>
+                  </a:txBody>
+                  <a:tcPr marL="68580" marR="68580" marT="0" marB="0"/>
+                </a:tc>
+                <a:tc>
+                  <a:txBody>
+                    <a:bodyPr/>
+                    <a:lstStyle/>
+                    <a:p>
+                      <a:pPr marL="0" marR="0" algn="ctr">
+                        <a:lnSpc>
+                          <a:spcPct val="107000"/>
+                        </a:lnSpc>
+                        <a:spcBef>
+                          <a:spcPts val="0"/>
+                        </a:spcBef>
+                        <a:spcAft>
+                          <a:spcPts val="0"/>
+                        </a:spcAft>
+                      </a:pPr>
+                      <a:r>
+                        <a:rPr lang="en-US" sz="1200" dirty="0">
+                          <a:effectLst/>
+                        </a:rPr>
+                        <a:t>1/13/20</a:t>
+                      </a:r>
+                      <a:endParaRPr lang="en-US" sz="1200" dirty="0">
+                        <a:effectLst/>
+                        <a:latin typeface="Times New Roman" panose="02020603050405020304" pitchFamily="18" charset="0"/>
+                        <a:ea typeface="Calibri" panose="020F0502020204030204" pitchFamily="34" charset="0"/>
+                      </a:endParaRPr>
+                    </a:p>
+                  </a:txBody>
+                  <a:tcPr marL="68580" marR="68580" marT="0" marB="0"/>
+                </a:tc>
+                <a:extLst>
+                  <a:ext uri="{0D108BD9-81ED-4DB2-BD59-A6C34878D82A}">
+                    <a16:rowId xmlns:a16="http://schemas.microsoft.com/office/drawing/2014/main" val="3716660243"/>
+                  </a:ext>
+                </a:extLst>
+              </a:tr>
+              <a:tr h="290993">
+                <a:tc>
+                  <a:txBody>
+                    <a:bodyPr/>
+                    <a:lstStyle/>
+                    <a:p>
+                      <a:pPr marL="0" marR="0">
+                        <a:lnSpc>
+                          <a:spcPct val="107000"/>
+                        </a:lnSpc>
+                        <a:spcBef>
+                          <a:spcPts val="0"/>
+                        </a:spcBef>
+                        <a:spcAft>
+                          <a:spcPts val="0"/>
+                        </a:spcAft>
+                      </a:pPr>
+                      <a:r>
+                        <a:rPr lang="en-US" sz="1200" b="1" dirty="0">
+                          <a:effectLst/>
+                        </a:rPr>
+                        <a:t>Messaging Capabilities</a:t>
+                      </a:r>
+                      <a:endParaRPr lang="en-US" sz="1200" b="1" dirty="0">
+                        <a:effectLst/>
+                        <a:latin typeface="Times New Roman" panose="02020603050405020304" pitchFamily="18" charset="0"/>
+                        <a:ea typeface="Calibri" panose="020F0502020204030204" pitchFamily="34" charset="0"/>
+                      </a:endParaRPr>
+                    </a:p>
+                  </a:txBody>
+                  <a:tcPr marL="68580" marR="68580" marT="0" marB="0"/>
+                </a:tc>
+                <a:tc>
+                  <a:txBody>
+                    <a:bodyPr/>
+                    <a:lstStyle/>
+                    <a:p>
+                      <a:pPr marL="0" marR="0" algn="ctr">
+                        <a:lnSpc>
+                          <a:spcPct val="107000"/>
+                        </a:lnSpc>
+                        <a:spcBef>
+                          <a:spcPts val="0"/>
+                        </a:spcBef>
+                        <a:spcAft>
+                          <a:spcPts val="0"/>
+                        </a:spcAft>
+                      </a:pPr>
+                      <a:r>
+                        <a:rPr lang="en-US" sz="1200" b="1" dirty="0">
+                          <a:effectLst/>
+                        </a:rPr>
+                        <a:t>1/13/20</a:t>
+                      </a:r>
+                      <a:endParaRPr lang="en-US" sz="1200" b="1" dirty="0">
+                        <a:effectLst/>
+                        <a:latin typeface="Times New Roman" panose="02020603050405020304" pitchFamily="18" charset="0"/>
+                        <a:ea typeface="Calibri" panose="020F0502020204030204" pitchFamily="34" charset="0"/>
+                      </a:endParaRPr>
+                    </a:p>
+                  </a:txBody>
+                  <a:tcPr marL="68580" marR="68580" marT="0" marB="0"/>
+                </a:tc>
+                <a:tc>
+                  <a:txBody>
+                    <a:bodyPr/>
+                    <a:lstStyle/>
+                    <a:p>
+                      <a:pPr marL="0" marR="0" algn="ctr">
+                        <a:lnSpc>
+                          <a:spcPct val="107000"/>
+                        </a:lnSpc>
+                        <a:spcBef>
+                          <a:spcPts val="0"/>
+                        </a:spcBef>
+                        <a:spcAft>
+                          <a:spcPts val="0"/>
+                        </a:spcAft>
+                      </a:pPr>
+                      <a:r>
+                        <a:rPr lang="en-US" sz="1200" b="1" dirty="0">
+                          <a:effectLst/>
+                        </a:rPr>
+                        <a:t>2/16/20</a:t>
+                      </a:r>
+                      <a:endParaRPr lang="en-US" sz="1200" b="1" dirty="0">
+                        <a:effectLst/>
+                        <a:latin typeface="Times New Roman" panose="02020603050405020304" pitchFamily="18" charset="0"/>
+                        <a:ea typeface="Calibri" panose="020F0502020204030204" pitchFamily="34" charset="0"/>
+                      </a:endParaRPr>
+                    </a:p>
+                  </a:txBody>
+                  <a:tcPr marL="68580" marR="68580" marT="0" marB="0"/>
+                </a:tc>
+                <a:extLst>
+                  <a:ext uri="{0D108BD9-81ED-4DB2-BD59-A6C34878D82A}">
+                    <a16:rowId xmlns:a16="http://schemas.microsoft.com/office/drawing/2014/main" val="2041006712"/>
+                  </a:ext>
+                </a:extLst>
+              </a:tr>
+              <a:tr h="290993">
+                <a:tc>
+                  <a:txBody>
+                    <a:bodyPr/>
+                    <a:lstStyle/>
+                    <a:p>
+                      <a:pPr marL="0" marR="0">
+                        <a:lnSpc>
+                          <a:spcPct val="107000"/>
+                        </a:lnSpc>
+                        <a:spcBef>
+                          <a:spcPts val="0"/>
+                        </a:spcBef>
+                        <a:spcAft>
+                          <a:spcPts val="0"/>
+                        </a:spcAft>
+                      </a:pPr>
+                      <a:r>
+                        <a:rPr lang="en-US" sz="1200" b="1" dirty="0">
+                          <a:effectLst/>
+                        </a:rPr>
+                        <a:t>Location Services</a:t>
+                      </a:r>
+                      <a:endParaRPr lang="en-US" sz="1200" b="1" dirty="0">
+                        <a:effectLst/>
+                        <a:latin typeface="Times New Roman" panose="02020603050405020304" pitchFamily="18" charset="0"/>
+                        <a:ea typeface="Calibri" panose="020F0502020204030204" pitchFamily="34" charset="0"/>
+                      </a:endParaRPr>
+                    </a:p>
+                  </a:txBody>
+                  <a:tcPr marL="68580" marR="68580" marT="0" marB="0"/>
+                </a:tc>
+                <a:tc>
+                  <a:txBody>
+                    <a:bodyPr/>
+                    <a:lstStyle/>
+                    <a:p>
+                      <a:pPr marL="0" marR="0" algn="ctr">
+                        <a:lnSpc>
+                          <a:spcPct val="107000"/>
+                        </a:lnSpc>
+                        <a:spcBef>
+                          <a:spcPts val="0"/>
+                        </a:spcBef>
+                        <a:spcAft>
+                          <a:spcPts val="0"/>
+                        </a:spcAft>
+                      </a:pPr>
+                      <a:r>
+                        <a:rPr lang="en-US" sz="1200" b="1" dirty="0">
+                          <a:effectLst/>
+                        </a:rPr>
+                        <a:t>1/13/20</a:t>
+                      </a:r>
+                      <a:endParaRPr lang="en-US" sz="1200" b="1" dirty="0">
+                        <a:effectLst/>
+                        <a:latin typeface="Times New Roman" panose="02020603050405020304" pitchFamily="18" charset="0"/>
+                        <a:ea typeface="Calibri" panose="020F0502020204030204" pitchFamily="34" charset="0"/>
+                      </a:endParaRPr>
+                    </a:p>
+                  </a:txBody>
+                  <a:tcPr marL="68580" marR="68580" marT="0" marB="0"/>
+                </a:tc>
+                <a:tc>
+                  <a:txBody>
+                    <a:bodyPr/>
+                    <a:lstStyle/>
+                    <a:p>
+                      <a:pPr marL="0" marR="0" algn="ctr">
+                        <a:lnSpc>
+                          <a:spcPct val="107000"/>
+                        </a:lnSpc>
+                        <a:spcBef>
+                          <a:spcPts val="0"/>
+                        </a:spcBef>
+                        <a:spcAft>
+                          <a:spcPts val="0"/>
+                        </a:spcAft>
+                      </a:pPr>
+                      <a:r>
+                        <a:rPr lang="en-US" sz="1200" b="1" dirty="0">
+                          <a:effectLst/>
+                        </a:rPr>
+                        <a:t>2/1/20</a:t>
+                      </a:r>
+                      <a:endParaRPr lang="en-US" sz="1200" b="1" dirty="0">
+                        <a:effectLst/>
+                        <a:latin typeface="Times New Roman" panose="02020603050405020304" pitchFamily="18" charset="0"/>
+                        <a:ea typeface="Calibri" panose="020F0502020204030204" pitchFamily="34" charset="0"/>
+                      </a:endParaRPr>
+                    </a:p>
+                  </a:txBody>
+                  <a:tcPr marL="68580" marR="68580" marT="0" marB="0"/>
+                </a:tc>
+                <a:extLst>
+                  <a:ext uri="{0D108BD9-81ED-4DB2-BD59-A6C34878D82A}">
+                    <a16:rowId xmlns:a16="http://schemas.microsoft.com/office/drawing/2014/main" val="1210542965"/>
+                  </a:ext>
+                </a:extLst>
+              </a:tr>
+              <a:tr h="290993">
+                <a:tc>
+                  <a:txBody>
+                    <a:bodyPr/>
+                    <a:lstStyle/>
+                    <a:p>
+                      <a:pPr marL="0" marR="0">
+                        <a:lnSpc>
+                          <a:spcPct val="107000"/>
+                        </a:lnSpc>
+                        <a:spcBef>
+                          <a:spcPts val="0"/>
+                        </a:spcBef>
+                        <a:spcAft>
+                          <a:spcPts val="0"/>
+                        </a:spcAft>
+                      </a:pPr>
+                      <a:r>
+                        <a:rPr lang="en-US" sz="1200" dirty="0">
+                          <a:effectLst/>
+                        </a:rPr>
+                        <a:t>Yelp Services</a:t>
+                      </a:r>
+                      <a:endParaRPr lang="en-US" sz="1200" dirty="0">
+                        <a:effectLst/>
+                        <a:latin typeface="Times New Roman" panose="02020603050405020304" pitchFamily="18" charset="0"/>
+                        <a:ea typeface="Calibri" panose="020F0502020204030204" pitchFamily="34" charset="0"/>
+                      </a:endParaRPr>
+                    </a:p>
+                  </a:txBody>
+                  <a:tcPr marL="68580" marR="68580" marT="0" marB="0"/>
+                </a:tc>
+                <a:tc>
+                  <a:txBody>
+                    <a:bodyPr/>
+                    <a:lstStyle/>
+                    <a:p>
+                      <a:pPr marL="0" marR="0" algn="ctr">
+                        <a:lnSpc>
+                          <a:spcPct val="107000"/>
+                        </a:lnSpc>
+                        <a:spcBef>
+                          <a:spcPts val="0"/>
+                        </a:spcBef>
+                        <a:spcAft>
+                          <a:spcPts val="0"/>
+                        </a:spcAft>
+                      </a:pPr>
+                      <a:r>
+                        <a:rPr lang="en-US" sz="1200" dirty="0">
+                          <a:effectLst/>
+                        </a:rPr>
+                        <a:t>2/1/20</a:t>
+                      </a:r>
+                      <a:endParaRPr lang="en-US" sz="1200" dirty="0">
+                        <a:effectLst/>
+                        <a:latin typeface="Times New Roman" panose="02020603050405020304" pitchFamily="18" charset="0"/>
+                        <a:ea typeface="Calibri" panose="020F0502020204030204" pitchFamily="34" charset="0"/>
+                      </a:endParaRPr>
+                    </a:p>
+                  </a:txBody>
+                  <a:tcPr marL="68580" marR="68580" marT="0" marB="0"/>
+                </a:tc>
+                <a:tc>
+                  <a:txBody>
+                    <a:bodyPr/>
+                    <a:lstStyle/>
+                    <a:p>
+                      <a:pPr marL="0" marR="0" algn="ctr">
+                        <a:lnSpc>
+                          <a:spcPct val="107000"/>
+                        </a:lnSpc>
+                        <a:spcBef>
+                          <a:spcPts val="0"/>
+                        </a:spcBef>
+                        <a:spcAft>
+                          <a:spcPts val="0"/>
+                        </a:spcAft>
+                      </a:pPr>
+                      <a:r>
+                        <a:rPr lang="en-US" sz="1200" dirty="0">
+                          <a:effectLst/>
+                        </a:rPr>
+                        <a:t>2/15/20</a:t>
+                      </a:r>
+                      <a:endParaRPr lang="en-US" sz="1200" dirty="0">
+                        <a:effectLst/>
+                        <a:latin typeface="Times New Roman" panose="02020603050405020304" pitchFamily="18" charset="0"/>
+                        <a:ea typeface="Calibri" panose="020F0502020204030204" pitchFamily="34" charset="0"/>
+                      </a:endParaRPr>
+                    </a:p>
+                  </a:txBody>
+                  <a:tcPr marL="68580" marR="68580" marT="0" marB="0"/>
+                </a:tc>
+                <a:extLst>
+                  <a:ext uri="{0D108BD9-81ED-4DB2-BD59-A6C34878D82A}">
+                    <a16:rowId xmlns:a16="http://schemas.microsoft.com/office/drawing/2014/main" val="419036765"/>
+                  </a:ext>
+                </a:extLst>
+              </a:tr>
+              <a:tr h="290993">
+                <a:tc>
+                  <a:txBody>
+                    <a:bodyPr/>
+                    <a:lstStyle/>
+                    <a:p>
+                      <a:pPr marL="0" marR="0">
+                        <a:lnSpc>
+                          <a:spcPct val="107000"/>
+                        </a:lnSpc>
+                        <a:spcBef>
+                          <a:spcPts val="0"/>
+                        </a:spcBef>
+                        <a:spcAft>
+                          <a:spcPts val="0"/>
+                        </a:spcAft>
+                      </a:pPr>
+                      <a:r>
+                        <a:rPr lang="en-US" sz="1200" dirty="0">
+                          <a:effectLst/>
+                        </a:rPr>
+                        <a:t>Concert Services</a:t>
+                      </a:r>
+                      <a:endParaRPr lang="en-US" sz="1200" dirty="0">
+                        <a:effectLst/>
+                        <a:latin typeface="Times New Roman" panose="02020603050405020304" pitchFamily="18" charset="0"/>
+                        <a:ea typeface="Calibri" panose="020F0502020204030204" pitchFamily="34" charset="0"/>
+                      </a:endParaRPr>
+                    </a:p>
+                  </a:txBody>
+                  <a:tcPr marL="68580" marR="68580" marT="0" marB="0"/>
+                </a:tc>
+                <a:tc>
+                  <a:txBody>
+                    <a:bodyPr/>
+                    <a:lstStyle/>
+                    <a:p>
+                      <a:pPr marL="0" marR="0" algn="ctr">
+                        <a:lnSpc>
+                          <a:spcPct val="107000"/>
+                        </a:lnSpc>
+                        <a:spcBef>
+                          <a:spcPts val="0"/>
+                        </a:spcBef>
+                        <a:spcAft>
+                          <a:spcPts val="0"/>
+                        </a:spcAft>
+                      </a:pPr>
+                      <a:r>
+                        <a:rPr lang="en-US" sz="1200" dirty="0">
+                          <a:effectLst/>
+                        </a:rPr>
+                        <a:t>2/16/20</a:t>
+                      </a:r>
+                      <a:endParaRPr lang="en-US" sz="1200" dirty="0">
+                        <a:effectLst/>
+                        <a:latin typeface="Times New Roman" panose="02020603050405020304" pitchFamily="18" charset="0"/>
+                        <a:ea typeface="Calibri" panose="020F0502020204030204" pitchFamily="34" charset="0"/>
+                      </a:endParaRPr>
+                    </a:p>
+                  </a:txBody>
+                  <a:tcPr marL="68580" marR="68580" marT="0" marB="0"/>
+                </a:tc>
+                <a:tc>
+                  <a:txBody>
+                    <a:bodyPr/>
+                    <a:lstStyle/>
+                    <a:p>
+                      <a:pPr marL="0" marR="0" algn="ctr">
+                        <a:lnSpc>
+                          <a:spcPct val="107000"/>
+                        </a:lnSpc>
+                        <a:spcBef>
+                          <a:spcPts val="0"/>
+                        </a:spcBef>
+                        <a:spcAft>
+                          <a:spcPts val="0"/>
+                        </a:spcAft>
+                      </a:pPr>
+                      <a:r>
+                        <a:rPr lang="en-US" sz="1200" dirty="0">
+                          <a:effectLst/>
+                        </a:rPr>
+                        <a:t>3/1/20</a:t>
+                      </a:r>
+                      <a:endParaRPr lang="en-US" sz="1200" dirty="0">
+                        <a:effectLst/>
+                        <a:latin typeface="Times New Roman" panose="02020603050405020304" pitchFamily="18" charset="0"/>
+                        <a:ea typeface="Calibri" panose="020F0502020204030204" pitchFamily="34" charset="0"/>
+                      </a:endParaRPr>
+                    </a:p>
+                  </a:txBody>
+                  <a:tcPr marL="68580" marR="68580" marT="0" marB="0"/>
+                </a:tc>
+                <a:extLst>
+                  <a:ext uri="{0D108BD9-81ED-4DB2-BD59-A6C34878D82A}">
+                    <a16:rowId xmlns:a16="http://schemas.microsoft.com/office/drawing/2014/main" val="2507616724"/>
+                  </a:ext>
+                </a:extLst>
+              </a:tr>
+              <a:tr h="290993">
+                <a:tc>
+                  <a:txBody>
+                    <a:bodyPr/>
+                    <a:lstStyle/>
+                    <a:p>
+                      <a:pPr marL="0" marR="0">
+                        <a:lnSpc>
+                          <a:spcPct val="107000"/>
+                        </a:lnSpc>
+                        <a:spcBef>
+                          <a:spcPts val="0"/>
+                        </a:spcBef>
+                        <a:spcAft>
+                          <a:spcPts val="0"/>
+                        </a:spcAft>
+                      </a:pPr>
+                      <a:r>
+                        <a:rPr lang="en-US" sz="1200" dirty="0">
+                          <a:effectLst/>
+                        </a:rPr>
+                        <a:t>Twitter Services</a:t>
+                      </a:r>
+                      <a:endParaRPr lang="en-US" sz="1200" dirty="0">
+                        <a:effectLst/>
+                        <a:latin typeface="Times New Roman" panose="02020603050405020304" pitchFamily="18" charset="0"/>
+                        <a:ea typeface="Calibri" panose="020F0502020204030204" pitchFamily="34" charset="0"/>
+                      </a:endParaRPr>
+                    </a:p>
+                  </a:txBody>
+                  <a:tcPr marL="68580" marR="68580" marT="0" marB="0"/>
+                </a:tc>
+                <a:tc>
+                  <a:txBody>
+                    <a:bodyPr/>
+                    <a:lstStyle/>
+                    <a:p>
+                      <a:pPr marL="0" marR="0" algn="ctr">
+                        <a:lnSpc>
+                          <a:spcPct val="107000"/>
+                        </a:lnSpc>
+                        <a:spcBef>
+                          <a:spcPts val="0"/>
+                        </a:spcBef>
+                        <a:spcAft>
+                          <a:spcPts val="0"/>
+                        </a:spcAft>
+                      </a:pPr>
+                      <a:r>
+                        <a:rPr lang="en-US" sz="1200" dirty="0">
+                          <a:effectLst/>
+                        </a:rPr>
+                        <a:t>3/1/20</a:t>
+                      </a:r>
+                      <a:endParaRPr lang="en-US" sz="1200" dirty="0">
+                        <a:effectLst/>
+                        <a:latin typeface="Times New Roman" panose="02020603050405020304" pitchFamily="18" charset="0"/>
+                        <a:ea typeface="Calibri" panose="020F0502020204030204" pitchFamily="34" charset="0"/>
+                      </a:endParaRPr>
+                    </a:p>
+                  </a:txBody>
+                  <a:tcPr marL="68580" marR="68580" marT="0" marB="0"/>
+                </a:tc>
+                <a:tc>
+                  <a:txBody>
+                    <a:bodyPr/>
+                    <a:lstStyle/>
+                    <a:p>
+                      <a:pPr marL="0" marR="0" algn="ctr">
+                        <a:lnSpc>
+                          <a:spcPct val="107000"/>
+                        </a:lnSpc>
+                        <a:spcBef>
+                          <a:spcPts val="0"/>
+                        </a:spcBef>
+                        <a:spcAft>
+                          <a:spcPts val="0"/>
+                        </a:spcAft>
+                      </a:pPr>
+                      <a:r>
+                        <a:rPr lang="en-US" sz="1200" dirty="0">
+                          <a:effectLst/>
+                        </a:rPr>
+                        <a:t>3/16/20</a:t>
+                      </a:r>
+                      <a:endParaRPr lang="en-US" sz="1200" dirty="0">
+                        <a:effectLst/>
+                        <a:latin typeface="Times New Roman" panose="02020603050405020304" pitchFamily="18" charset="0"/>
+                        <a:ea typeface="Calibri" panose="020F0502020204030204" pitchFamily="34" charset="0"/>
+                      </a:endParaRPr>
+                    </a:p>
+                  </a:txBody>
+                  <a:tcPr marL="68580" marR="68580" marT="0" marB="0"/>
+                </a:tc>
+                <a:extLst>
+                  <a:ext uri="{0D108BD9-81ED-4DB2-BD59-A6C34878D82A}">
+                    <a16:rowId xmlns:a16="http://schemas.microsoft.com/office/drawing/2014/main" val="2790218662"/>
+                  </a:ext>
+                </a:extLst>
+              </a:tr>
+              <a:tr h="290993">
+                <a:tc>
+                  <a:txBody>
+                    <a:bodyPr/>
+                    <a:lstStyle/>
+                    <a:p>
+                      <a:pPr marL="0" marR="0">
+                        <a:lnSpc>
+                          <a:spcPct val="107000"/>
+                        </a:lnSpc>
+                        <a:spcBef>
+                          <a:spcPts val="0"/>
+                        </a:spcBef>
+                        <a:spcAft>
+                          <a:spcPts val="0"/>
+                        </a:spcAft>
+                      </a:pPr>
+                      <a:r>
+                        <a:rPr lang="en-US" sz="1200" dirty="0">
+                          <a:effectLst/>
+                        </a:rPr>
+                        <a:t>Facebook Services</a:t>
+                      </a:r>
+                      <a:endParaRPr lang="en-US" sz="1200" dirty="0">
+                        <a:effectLst/>
+                        <a:latin typeface="Times New Roman" panose="02020603050405020304" pitchFamily="18" charset="0"/>
+                        <a:ea typeface="Calibri" panose="020F0502020204030204" pitchFamily="34" charset="0"/>
+                      </a:endParaRPr>
+                    </a:p>
+                  </a:txBody>
+                  <a:tcPr marL="68580" marR="68580" marT="0" marB="0"/>
+                </a:tc>
+                <a:tc>
+                  <a:txBody>
+                    <a:bodyPr/>
+                    <a:lstStyle/>
+                    <a:p>
+                      <a:pPr marL="0" marR="0" algn="ctr">
+                        <a:lnSpc>
+                          <a:spcPct val="107000"/>
+                        </a:lnSpc>
+                        <a:spcBef>
+                          <a:spcPts val="0"/>
+                        </a:spcBef>
+                        <a:spcAft>
+                          <a:spcPts val="0"/>
+                        </a:spcAft>
+                      </a:pPr>
+                      <a:r>
+                        <a:rPr lang="en-US" sz="1200" dirty="0">
+                          <a:effectLst/>
+                        </a:rPr>
+                        <a:t>3/1/20</a:t>
+                      </a:r>
+                      <a:endParaRPr lang="en-US" sz="1200" dirty="0">
+                        <a:effectLst/>
+                        <a:latin typeface="Times New Roman" panose="02020603050405020304" pitchFamily="18" charset="0"/>
+                        <a:ea typeface="Calibri" panose="020F0502020204030204" pitchFamily="34" charset="0"/>
+                      </a:endParaRPr>
+                    </a:p>
+                  </a:txBody>
+                  <a:tcPr marL="68580" marR="68580" marT="0" marB="0"/>
+                </a:tc>
+                <a:tc>
+                  <a:txBody>
+                    <a:bodyPr/>
+                    <a:lstStyle/>
+                    <a:p>
+                      <a:pPr marL="0" marR="0" algn="ctr">
+                        <a:lnSpc>
+                          <a:spcPct val="107000"/>
+                        </a:lnSpc>
+                        <a:spcBef>
+                          <a:spcPts val="0"/>
+                        </a:spcBef>
+                        <a:spcAft>
+                          <a:spcPts val="0"/>
+                        </a:spcAft>
+                      </a:pPr>
+                      <a:r>
+                        <a:rPr lang="en-US" sz="1200" dirty="0">
+                          <a:effectLst/>
+                        </a:rPr>
+                        <a:t>3/16/20</a:t>
+                      </a:r>
+                      <a:endParaRPr lang="en-US" sz="1200" dirty="0">
+                        <a:effectLst/>
+                        <a:latin typeface="Times New Roman" panose="02020603050405020304" pitchFamily="18" charset="0"/>
+                        <a:ea typeface="Calibri" panose="020F0502020204030204" pitchFamily="34" charset="0"/>
+                      </a:endParaRPr>
+                    </a:p>
+                  </a:txBody>
+                  <a:tcPr marL="68580" marR="68580" marT="0" marB="0"/>
+                </a:tc>
+                <a:extLst>
+                  <a:ext uri="{0D108BD9-81ED-4DB2-BD59-A6C34878D82A}">
+                    <a16:rowId xmlns:a16="http://schemas.microsoft.com/office/drawing/2014/main" val="806125338"/>
+                  </a:ext>
+                </a:extLst>
+              </a:tr>
+              <a:tr h="290993">
+                <a:tc>
+                  <a:txBody>
+                    <a:bodyPr/>
+                    <a:lstStyle/>
+                    <a:p>
+                      <a:pPr marL="0" marR="0">
+                        <a:lnSpc>
+                          <a:spcPct val="107000"/>
+                        </a:lnSpc>
+                        <a:spcBef>
+                          <a:spcPts val="0"/>
+                        </a:spcBef>
+                        <a:spcAft>
+                          <a:spcPts val="0"/>
+                        </a:spcAft>
+                      </a:pPr>
+                      <a:r>
+                        <a:rPr lang="en-US" sz="1200" b="1" dirty="0">
+                          <a:effectLst/>
+                        </a:rPr>
+                        <a:t>Google Play Store</a:t>
+                      </a:r>
+                      <a:endParaRPr lang="en-US" sz="1200" b="1" dirty="0">
+                        <a:effectLst/>
+                        <a:latin typeface="Times New Roman" panose="02020603050405020304" pitchFamily="18" charset="0"/>
+                        <a:ea typeface="Calibri" panose="020F0502020204030204" pitchFamily="34" charset="0"/>
+                      </a:endParaRPr>
+                    </a:p>
+                  </a:txBody>
+                  <a:tcPr marL="68580" marR="68580" marT="0" marB="0"/>
+                </a:tc>
+                <a:tc>
+                  <a:txBody>
+                    <a:bodyPr/>
+                    <a:lstStyle/>
+                    <a:p>
+                      <a:pPr marL="0" marR="0" algn="ctr">
+                        <a:lnSpc>
+                          <a:spcPct val="107000"/>
+                        </a:lnSpc>
+                        <a:spcBef>
+                          <a:spcPts val="0"/>
+                        </a:spcBef>
+                        <a:spcAft>
+                          <a:spcPts val="0"/>
+                        </a:spcAft>
+                      </a:pPr>
+                      <a:r>
+                        <a:rPr lang="en-US" sz="1200" b="1" dirty="0">
+                          <a:effectLst/>
+                        </a:rPr>
+                        <a:t>3/16/20</a:t>
+                      </a:r>
+                      <a:endParaRPr lang="en-US" sz="1200" b="1" dirty="0">
+                        <a:effectLst/>
+                        <a:latin typeface="Times New Roman" panose="02020603050405020304" pitchFamily="18" charset="0"/>
+                        <a:ea typeface="Calibri" panose="020F0502020204030204" pitchFamily="34" charset="0"/>
+                      </a:endParaRPr>
+                    </a:p>
+                  </a:txBody>
+                  <a:tcPr marL="68580" marR="68580" marT="0" marB="0"/>
+                </a:tc>
+                <a:tc>
+                  <a:txBody>
+                    <a:bodyPr/>
+                    <a:lstStyle/>
+                    <a:p>
+                      <a:pPr marL="0" marR="0" algn="ctr">
+                        <a:lnSpc>
+                          <a:spcPct val="107000"/>
+                        </a:lnSpc>
+                        <a:spcBef>
+                          <a:spcPts val="0"/>
+                        </a:spcBef>
+                        <a:spcAft>
+                          <a:spcPts val="0"/>
+                        </a:spcAft>
+                      </a:pPr>
+                      <a:r>
+                        <a:rPr lang="en-US" sz="1200" b="1" dirty="0">
+                          <a:effectLst/>
+                        </a:rPr>
+                        <a:t>4/1/20</a:t>
+                      </a:r>
+                      <a:endParaRPr lang="en-US" sz="1200" b="1" dirty="0">
+                        <a:effectLst/>
+                        <a:latin typeface="Times New Roman" panose="02020603050405020304" pitchFamily="18" charset="0"/>
+                        <a:ea typeface="Calibri" panose="020F0502020204030204" pitchFamily="34" charset="0"/>
+                      </a:endParaRPr>
+                    </a:p>
+                  </a:txBody>
+                  <a:tcPr marL="68580" marR="68580" marT="0" marB="0"/>
+                </a:tc>
+                <a:extLst>
+                  <a:ext uri="{0D108BD9-81ED-4DB2-BD59-A6C34878D82A}">
+                    <a16:rowId xmlns:a16="http://schemas.microsoft.com/office/drawing/2014/main" val="2403260653"/>
+                  </a:ext>
+                </a:extLst>
+              </a:tr>
+              <a:tr h="290993">
+                <a:tc>
+                  <a:txBody>
+                    <a:bodyPr/>
+                    <a:lstStyle/>
+                    <a:p>
+                      <a:pPr marL="0" marR="0">
+                        <a:lnSpc>
+                          <a:spcPct val="107000"/>
+                        </a:lnSpc>
+                        <a:spcBef>
+                          <a:spcPts val="0"/>
+                        </a:spcBef>
+                        <a:spcAft>
+                          <a:spcPts val="0"/>
+                        </a:spcAft>
+                      </a:pPr>
+                      <a:r>
+                        <a:rPr lang="en-US" sz="1200" dirty="0">
+                          <a:effectLst/>
+                        </a:rPr>
+                        <a:t>Refining and Refactoring</a:t>
+                      </a:r>
+                      <a:endParaRPr lang="en-US" sz="1200" dirty="0">
+                        <a:effectLst/>
+                        <a:latin typeface="Times New Roman" panose="02020603050405020304" pitchFamily="18" charset="0"/>
+                        <a:ea typeface="Calibri" panose="020F0502020204030204" pitchFamily="34" charset="0"/>
+                      </a:endParaRPr>
+                    </a:p>
+                  </a:txBody>
+                  <a:tcPr marL="68580" marR="68580" marT="0" marB="0"/>
+                </a:tc>
+                <a:tc>
+                  <a:txBody>
+                    <a:bodyPr/>
+                    <a:lstStyle/>
+                    <a:p>
+                      <a:pPr marL="0" marR="0" algn="ctr">
+                        <a:lnSpc>
+                          <a:spcPct val="107000"/>
+                        </a:lnSpc>
+                        <a:spcBef>
+                          <a:spcPts val="0"/>
+                        </a:spcBef>
+                        <a:spcAft>
+                          <a:spcPts val="0"/>
+                        </a:spcAft>
+                      </a:pPr>
+                      <a:r>
+                        <a:rPr lang="en-US" sz="1200" dirty="0">
+                          <a:effectLst/>
+                        </a:rPr>
+                        <a:t>4/1/20</a:t>
+                      </a:r>
+                      <a:endParaRPr lang="en-US" sz="1200" dirty="0">
+                        <a:effectLst/>
+                        <a:latin typeface="Times New Roman" panose="02020603050405020304" pitchFamily="18" charset="0"/>
+                        <a:ea typeface="Calibri" panose="020F0502020204030204" pitchFamily="34" charset="0"/>
+                      </a:endParaRPr>
+                    </a:p>
+                  </a:txBody>
+                  <a:tcPr marL="68580" marR="68580" marT="0" marB="0"/>
+                </a:tc>
+                <a:tc>
+                  <a:txBody>
+                    <a:bodyPr/>
+                    <a:lstStyle/>
+                    <a:p>
+                      <a:pPr marL="0" marR="0" algn="ctr">
+                        <a:lnSpc>
+                          <a:spcPct val="107000"/>
+                        </a:lnSpc>
+                        <a:spcBef>
+                          <a:spcPts val="0"/>
+                        </a:spcBef>
+                        <a:spcAft>
+                          <a:spcPts val="0"/>
+                        </a:spcAft>
+                      </a:pPr>
+                      <a:r>
+                        <a:rPr lang="en-US" sz="1200" dirty="0">
+                          <a:effectLst/>
+                        </a:rPr>
+                        <a:t>Expo</a:t>
+                      </a:r>
+                      <a:endParaRPr lang="en-US" sz="1200" dirty="0">
+                        <a:effectLst/>
+                        <a:latin typeface="Times New Roman" panose="02020603050405020304" pitchFamily="18" charset="0"/>
+                        <a:ea typeface="Calibri" panose="020F0502020204030204" pitchFamily="34" charset="0"/>
+                      </a:endParaRPr>
+                    </a:p>
+                  </a:txBody>
+                  <a:tcPr marL="68580" marR="68580" marT="0" marB="0"/>
+                </a:tc>
+                <a:extLst>
+                  <a:ext uri="{0D108BD9-81ED-4DB2-BD59-A6C34878D82A}">
+                    <a16:rowId xmlns:a16="http://schemas.microsoft.com/office/drawing/2014/main" val="3055926300"/>
+                  </a:ext>
+                </a:extLst>
+              </a:tr>
+            </a:tbl>
+          </a:graphicData>
+        </a:graphic>
+      </p:graphicFrame>
     </p:spTree>
     <p:extLst>
       <p:ext uri="{BB962C8B-B14F-4D97-AF65-F5344CB8AC3E}">
-        <p14:creationId xmlns:p14="http://schemas.microsoft.com/office/powerpoint/2010/main" val="327352126"/>
+        <p14:creationId xmlns:p14="http://schemas.microsoft.com/office/powerpoint/2010/main" val="1219630728"/>
       </p:ext>
     </p:extLst>
   </p:cSld>
@@ -4093,7 +5822,7 @@
           <p:cNvPr id="2" name="Title 1">
             <a:extLst>
               <a:ext uri="{FF2B5EF4-FFF2-40B4-BE49-F238E27FC236}">
-                <a16:creationId xmlns:a16="http://schemas.microsoft.com/office/drawing/2014/main" id="{BA36E25D-88D7-4041-9EC7-90B735FC6C82}"/>
+                <a16:creationId xmlns:a16="http://schemas.microsoft.com/office/drawing/2014/main" id="{287274E1-0DE0-4EE0-A625-50647812E8CD}"/>
               </a:ext>
             </a:extLst>
           </p:cNvPr>
@@ -4111,7 +5840,7 @@
           <a:p>
             <a:r>
               <a:rPr lang="en-US" dirty="0"/>
-              <a:t>Milestones</a:t>
+              <a:t>Results</a:t>
             </a:r>
           </a:p>
         </p:txBody>
@@ -4121,7 +5850,7 @@
           <p:cNvPr id="3" name="Content Placeholder 2">
             <a:extLst>
               <a:ext uri="{FF2B5EF4-FFF2-40B4-BE49-F238E27FC236}">
-                <a16:creationId xmlns:a16="http://schemas.microsoft.com/office/drawing/2014/main" id="{7DA00849-C0D5-412F-97C8-CADCB8868448}"/>
+                <a16:creationId xmlns:a16="http://schemas.microsoft.com/office/drawing/2014/main" id="{4141B9E7-FFA3-4AC3-B588-3322109E8D15}"/>
               </a:ext>
             </a:extLst>
           </p:cNvPr>
@@ -4137,14 +5866,41 @@
           <a:bodyPr/>
           <a:lstStyle/>
           <a:p>
-            <a:endParaRPr lang="en-US"/>
+            <a:r>
+              <a:rPr lang="en-US" dirty="0"/>
+              <a:t>Ability to schedule events</a:t>
+            </a:r>
+          </a:p>
+          <a:p>
+            <a:r>
+              <a:rPr lang="en-US" dirty="0"/>
+              <a:t>Working front end and back end</a:t>
+            </a:r>
+          </a:p>
+          <a:p>
+            <a:r>
+              <a:rPr lang="en-US" dirty="0"/>
+              <a:t>Messaging capabilities are a work in progress</a:t>
+            </a:r>
+          </a:p>
+          <a:p>
+            <a:r>
+              <a:rPr lang="en-US" dirty="0"/>
+              <a:t>Final design of front end is a work in progress</a:t>
+            </a:r>
+          </a:p>
+          <a:p>
+            <a:endParaRPr lang="en-US" dirty="0"/>
+          </a:p>
+          <a:p>
+            <a:endParaRPr lang="en-US" dirty="0"/>
           </a:p>
         </p:txBody>
       </p:sp>
     </p:spTree>
     <p:extLst>
       <p:ext uri="{BB962C8B-B14F-4D97-AF65-F5344CB8AC3E}">
-        <p14:creationId xmlns:p14="http://schemas.microsoft.com/office/powerpoint/2010/main" val="1219630728"/>
+        <p14:creationId xmlns:p14="http://schemas.microsoft.com/office/powerpoint/2010/main" val="2912711350"/>
       </p:ext>
     </p:extLst>
   </p:cSld>
@@ -4176,7 +5932,7 @@
           <p:cNvPr id="2" name="Title 1">
             <a:extLst>
               <a:ext uri="{FF2B5EF4-FFF2-40B4-BE49-F238E27FC236}">
-                <a16:creationId xmlns:a16="http://schemas.microsoft.com/office/drawing/2014/main" id="{287274E1-0DE0-4EE0-A625-50647812E8CD}"/>
+                <a16:creationId xmlns:a16="http://schemas.microsoft.com/office/drawing/2014/main" id="{45C9ABBF-F186-4A07-8CF2-D7A0574F3B4B}"/>
               </a:ext>
             </a:extLst>
           </p:cNvPr>
@@ -4194,7 +5950,7 @@
           <a:p>
             <a:r>
               <a:rPr lang="en-US" dirty="0"/>
-              <a:t>Results</a:t>
+              <a:t>Challenges</a:t>
             </a:r>
           </a:p>
         </p:txBody>
@@ -4204,7 +5960,7 @@
           <p:cNvPr id="3" name="Content Placeholder 2">
             <a:extLst>
               <a:ext uri="{FF2B5EF4-FFF2-40B4-BE49-F238E27FC236}">
-                <a16:creationId xmlns:a16="http://schemas.microsoft.com/office/drawing/2014/main" id="{4141B9E7-FFA3-4AC3-B588-3322109E8D15}"/>
+                <a16:creationId xmlns:a16="http://schemas.microsoft.com/office/drawing/2014/main" id="{D99D1089-0AE5-4D5C-849B-E27340AE7678}"/>
               </a:ext>
             </a:extLst>
           </p:cNvPr>
@@ -4220,14 +5976,45 @@
           <a:bodyPr/>
           <a:lstStyle/>
           <a:p>
-            <a:endParaRPr lang="en-US"/>
+            <a:pPr marL="857250" indent="-857250"/>
+            <a:r>
+              <a:rPr lang="en-US" dirty="0"/>
+              <a:t>By far the biggest challenge is keeping testing up to date.  Nothing gets added into the code without thorough testing.</a:t>
+            </a:r>
+          </a:p>
+          <a:p>
+            <a:pPr marL="857250" indent="-857250"/>
+            <a:r>
+              <a:rPr lang="en-US" dirty="0"/>
+              <a:t>Other commitments, such as school, and homework take a lot of time away from the project.</a:t>
+            </a:r>
+          </a:p>
+          <a:p>
+            <a:pPr marL="857250" indent="-857250"/>
+            <a:r>
+              <a:rPr lang="en-US" dirty="0"/>
+              <a:t>Agreement between group on API routes was another challenge.</a:t>
+            </a:r>
+          </a:p>
+          <a:p>
+            <a:pPr marL="857250" indent="-857250"/>
+            <a:r>
+              <a:rPr lang="en-US" dirty="0"/>
+              <a:t>Django Rest Framework makes writing the API easier, but there is a lot to know in order to do everything properly.</a:t>
+            </a:r>
+          </a:p>
+          <a:p>
+            <a:pPr marL="0" indent="0">
+              <a:buNone/>
+            </a:pPr>
+            <a:endParaRPr lang="en-US" dirty="0"/>
           </a:p>
         </p:txBody>
       </p:sp>
     </p:spTree>
     <p:extLst>
       <p:ext uri="{BB962C8B-B14F-4D97-AF65-F5344CB8AC3E}">
-        <p14:creationId xmlns:p14="http://schemas.microsoft.com/office/powerpoint/2010/main" val="2912711350"/>
+        <p14:creationId xmlns:p14="http://schemas.microsoft.com/office/powerpoint/2010/main" val="2916109359"/>
       </p:ext>
     </p:extLst>
   </p:cSld>
@@ -4530,4 +6317,240 @@
     </a:ext>
   </a:extLst>
 </a:theme>
+</file>
+
+<file path=customXml/item1.xml><?xml version="1.0" encoding="utf-8"?>
+<?mso-contentType ?>
+<FormTemplates xmlns="http://schemas.microsoft.com/sharepoint/v3/contenttype/forms">
+  <Display>DocumentLibraryForm</Display>
+  <Edit>DocumentLibraryForm</Edit>
+  <New>DocumentLibraryForm</New>
+</FormTemplates>
+</file>
+
+<file path=customXml/item2.xml><?xml version="1.0" encoding="utf-8"?>
+<ct:contentTypeSchema xmlns:ct="http://schemas.microsoft.com/office/2006/metadata/contentType" xmlns:ma="http://schemas.microsoft.com/office/2006/metadata/properties/metaAttributes" ct:_="" ma:_="" ma:contentTypeName="Document" ma:contentTypeID="0x01010087FD3837DCDEFE44B5E2E77ABA929239" ma:contentTypeVersion="6" ma:contentTypeDescription="Create a new document." ma:contentTypeScope="" ma:versionID="0e30e9ed8776833014da8c6f20359aae">
+  <xsd:schema xmlns:xsd="http://www.w3.org/2001/XMLSchema" xmlns:xs="http://www.w3.org/2001/XMLSchema" xmlns:p="http://schemas.microsoft.com/office/2006/metadata/properties" xmlns:ns3="5deb6c97-c936-4308-81a8-b8a75559ecd6" xmlns:ns4="a032c742-003c-4072-a5d2-2b436e1cb932" targetNamespace="http://schemas.microsoft.com/office/2006/metadata/properties" ma:root="true" ma:fieldsID="c7093c9ff76ebe117513bca3fe9b67a0" ns3:_="" ns4:_="">
+    <xsd:import namespace="5deb6c97-c936-4308-81a8-b8a75559ecd6"/>
+    <xsd:import namespace="a032c742-003c-4072-a5d2-2b436e1cb932"/>
+    <xsd:element name="properties">
+      <xsd:complexType>
+        <xsd:sequence>
+          <xsd:element name="documentManagement">
+            <xsd:complexType>
+              <xsd:all>
+                <xsd:element ref="ns3:MediaServiceMetadata" minOccurs="0"/>
+                <xsd:element ref="ns3:MediaServiceFastMetadata" minOccurs="0"/>
+                <xsd:element ref="ns4:SharedWithUsers" minOccurs="0"/>
+                <xsd:element ref="ns4:SharedWithDetails" minOccurs="0"/>
+                <xsd:element ref="ns4:SharingHintHash" minOccurs="0"/>
+                <xsd:element ref="ns3:MediaServiceDateTaken" minOccurs="0"/>
+              </xsd:all>
+            </xsd:complexType>
+          </xsd:element>
+        </xsd:sequence>
+      </xsd:complexType>
+    </xsd:element>
+  </xsd:schema>
+  <xsd:schema xmlns:xsd="http://www.w3.org/2001/XMLSchema" xmlns:xs="http://www.w3.org/2001/XMLSchema" xmlns:dms="http://schemas.microsoft.com/office/2006/documentManagement/types" xmlns:pc="http://schemas.microsoft.com/office/infopath/2007/PartnerControls" targetNamespace="5deb6c97-c936-4308-81a8-b8a75559ecd6" elementFormDefault="qualified">
+    <xsd:import namespace="http://schemas.microsoft.com/office/2006/documentManagement/types"/>
+    <xsd:import namespace="http://schemas.microsoft.com/office/infopath/2007/PartnerControls"/>
+    <xsd:element name="MediaServiceMetadata" ma:index="8" nillable="true" ma:displayName="MediaServiceMetadata" ma:hidden="true" ma:internalName="MediaServiceMetadata" ma:readOnly="true">
+      <xsd:simpleType>
+        <xsd:restriction base="dms:Note"/>
+      </xsd:simpleType>
+    </xsd:element>
+    <xsd:element name="MediaServiceFastMetadata" ma:index="9" nillable="true" ma:displayName="MediaServiceFastMetadata" ma:hidden="true" ma:internalName="MediaServiceFastMetadata" ma:readOnly="true">
+      <xsd:simpleType>
+        <xsd:restriction base="dms:Note"/>
+      </xsd:simpleType>
+    </xsd:element>
+    <xsd:element name="MediaServiceDateTaken" ma:index="13" nillable="true" ma:displayName="MediaServiceDateTaken" ma:hidden="true" ma:internalName="MediaServiceDateTaken" ma:readOnly="true">
+      <xsd:simpleType>
+        <xsd:restriction base="dms:Text"/>
+      </xsd:simpleType>
+    </xsd:element>
+  </xsd:schema>
+  <xsd:schema xmlns:xsd="http://www.w3.org/2001/XMLSchema" xmlns:xs="http://www.w3.org/2001/XMLSchema" xmlns:dms="http://schemas.microsoft.com/office/2006/documentManagement/types" xmlns:pc="http://schemas.microsoft.com/office/infopath/2007/PartnerControls" targetNamespace="a032c742-003c-4072-a5d2-2b436e1cb932" elementFormDefault="qualified">
+    <xsd:import namespace="http://schemas.microsoft.com/office/2006/documentManagement/types"/>
+    <xsd:import namespace="http://schemas.microsoft.com/office/infopath/2007/PartnerControls"/>
+    <xsd:element name="SharedWithUsers" ma:index="10" nillable="true" ma:displayName="Shared With" ma:internalName="SharedWithUsers" ma:readOnly="true">
+      <xsd:complexType>
+        <xsd:complexContent>
+          <xsd:extension base="dms:UserMulti">
+            <xsd:sequence>
+              <xsd:element name="UserInfo" minOccurs="0" maxOccurs="unbounded">
+                <xsd:complexType>
+                  <xsd:sequence>
+                    <xsd:element name="DisplayName" type="xsd:string" minOccurs="0"/>
+                    <xsd:element name="AccountId" type="dms:UserId" minOccurs="0" nillable="true"/>
+                    <xsd:element name="AccountType" type="xsd:string" minOccurs="0"/>
+                  </xsd:sequence>
+                </xsd:complexType>
+              </xsd:element>
+            </xsd:sequence>
+          </xsd:extension>
+        </xsd:complexContent>
+      </xsd:complexType>
+    </xsd:element>
+    <xsd:element name="SharedWithDetails" ma:index="11" nillable="true" ma:displayName="Shared With Details" ma:internalName="SharedWithDetails" ma:readOnly="true">
+      <xsd:simpleType>
+        <xsd:restriction base="dms:Note">
+          <xsd:maxLength value="255"/>
+        </xsd:restriction>
+      </xsd:simpleType>
+    </xsd:element>
+    <xsd:element name="SharingHintHash" ma:index="12" nillable="true" ma:displayName="Sharing Hint Hash" ma:hidden="true" ma:internalName="SharingHintHash" ma:readOnly="true">
+      <xsd:simpleType>
+        <xsd:restriction base="dms:Text"/>
+      </xsd:simpleType>
+    </xsd:element>
+  </xsd:schema>
+  <xsd:schema xmlns="http://schemas.openxmlformats.org/package/2006/metadata/core-properties" xmlns:xsd="http://www.w3.org/2001/XMLSchema" xmlns:xsi="http://www.w3.org/2001/XMLSchema-instance" xmlns:dc="http://purl.org/dc/elements/1.1/" xmlns:dcterms="http://purl.org/dc/terms/" xmlns:odoc="http://schemas.microsoft.com/internal/obd" targetNamespace="http://schemas.openxmlformats.org/package/2006/metadata/core-properties" elementFormDefault="qualified" attributeFormDefault="unqualified" blockDefault="#all">
+    <xsd:import namespace="http://purl.org/dc/elements/1.1/" schemaLocation="http://dublincore.org/schemas/xmls/qdc/2003/04/02/dc.xsd"/>
+    <xsd:import namespace="http://purl.org/dc/terms/" schemaLocation="http://dublincore.org/schemas/xmls/qdc/2003/04/02/dcterms.xsd"/>
+    <xsd:element name="coreProperties" type="CT_coreProperties"/>
+    <xsd:complexType name="CT_coreProperties">
+      <xsd:all>
+        <xsd:element ref="dc:creator" minOccurs="0" maxOccurs="1"/>
+        <xsd:element ref="dcterms:created" minOccurs="0" maxOccurs="1"/>
+        <xsd:element ref="dc:identifier" minOccurs="0" maxOccurs="1"/>
+        <xsd:element name="contentType" minOccurs="0" maxOccurs="1" type="xsd:string" ma:index="0" ma:displayName="Content Type"/>
+        <xsd:element ref="dc:title" minOccurs="0" maxOccurs="1" ma:index="4" ma:displayName="Title"/>
+        <xsd:element ref="dc:subject" minOccurs="0" maxOccurs="1"/>
+        <xsd:element ref="dc:description" minOccurs="0" maxOccurs="1"/>
+        <xsd:element name="keywords" minOccurs="0" maxOccurs="1" type="xsd:string"/>
+        <xsd:element ref="dc:language" minOccurs="0" maxOccurs="1"/>
+        <xsd:element name="category" minOccurs="0" maxOccurs="1" type="xsd:string"/>
+        <xsd:element name="version" minOccurs="0" maxOccurs="1" type="xsd:string"/>
+        <xsd:element name="revision" minOccurs="0" maxOccurs="1" type="xsd:string">
+          <xsd:annotation>
+            <xsd:documentation>
+                        This value indicates the number of saves or revisions. The application is responsible for updating this value after each revision.
+                    </xsd:documentation>
+          </xsd:annotation>
+        </xsd:element>
+        <xsd:element name="lastModifiedBy" minOccurs="0" maxOccurs="1" type="xsd:string"/>
+        <xsd:element ref="dcterms:modified" minOccurs="0" maxOccurs="1"/>
+        <xsd:element name="contentStatus" minOccurs="0" maxOccurs="1" type="xsd:string"/>
+      </xsd:all>
+    </xsd:complexType>
+  </xsd:schema>
+  <xs:schema xmlns:pc="http://schemas.microsoft.com/office/infopath/2007/PartnerControls" xmlns:xs="http://www.w3.org/2001/XMLSchema" targetNamespace="http://schemas.microsoft.com/office/infopath/2007/PartnerControls" elementFormDefault="qualified" attributeFormDefault="unqualified">
+    <xs:element name="Person">
+      <xs:complexType>
+        <xs:sequence>
+          <xs:element ref="pc:DisplayName" minOccurs="0"/>
+          <xs:element ref="pc:AccountId" minOccurs="0"/>
+          <xs:element ref="pc:AccountType" minOccurs="0"/>
+        </xs:sequence>
+      </xs:complexType>
+    </xs:element>
+    <xs:element name="DisplayName" type="xs:string"/>
+    <xs:element name="AccountId" type="xs:string"/>
+    <xs:element name="AccountType" type="xs:string"/>
+    <xs:element name="BDCAssociatedEntity">
+      <xs:complexType>
+        <xs:sequence>
+          <xs:element ref="pc:BDCEntity" minOccurs="0" maxOccurs="unbounded"/>
+        </xs:sequence>
+        <xs:attribute ref="pc:EntityNamespace"/>
+        <xs:attribute ref="pc:EntityName"/>
+        <xs:attribute ref="pc:SystemInstanceName"/>
+        <xs:attribute ref="pc:AssociationName"/>
+      </xs:complexType>
+    </xs:element>
+    <xs:attribute name="EntityNamespace" type="xs:string"/>
+    <xs:attribute name="EntityName" type="xs:string"/>
+    <xs:attribute name="SystemInstanceName" type="xs:string"/>
+    <xs:attribute name="AssociationName" type="xs:string"/>
+    <xs:element name="BDCEntity">
+      <xs:complexType>
+        <xs:sequence>
+          <xs:element ref="pc:EntityDisplayName" minOccurs="0"/>
+          <xs:element ref="pc:EntityInstanceReference" minOccurs="0"/>
+          <xs:element ref="pc:EntityId1" minOccurs="0"/>
+          <xs:element ref="pc:EntityId2" minOccurs="0"/>
+          <xs:element ref="pc:EntityId3" minOccurs="0"/>
+          <xs:element ref="pc:EntityId4" minOccurs="0"/>
+          <xs:element ref="pc:EntityId5" minOccurs="0"/>
+        </xs:sequence>
+      </xs:complexType>
+    </xs:element>
+    <xs:element name="EntityDisplayName" type="xs:string"/>
+    <xs:element name="EntityInstanceReference" type="xs:string"/>
+    <xs:element name="EntityId1" type="xs:string"/>
+    <xs:element name="EntityId2" type="xs:string"/>
+    <xs:element name="EntityId3" type="xs:string"/>
+    <xs:element name="EntityId4" type="xs:string"/>
+    <xs:element name="EntityId5" type="xs:string"/>
+    <xs:element name="Terms">
+      <xs:complexType>
+        <xs:sequence>
+          <xs:element ref="pc:TermInfo" minOccurs="0" maxOccurs="unbounded"/>
+        </xs:sequence>
+      </xs:complexType>
+    </xs:element>
+    <xs:element name="TermInfo">
+      <xs:complexType>
+        <xs:sequence>
+          <xs:element ref="pc:TermName" minOccurs="0"/>
+          <xs:element ref="pc:TermId" minOccurs="0"/>
+        </xs:sequence>
+      </xs:complexType>
+    </xs:element>
+    <xs:element name="TermName" type="xs:string"/>
+    <xs:element name="TermId" type="xs:string"/>
+  </xs:schema>
+</ct:contentTypeSchema>
+</file>
+
+<file path=customXml/item3.xml><?xml version="1.0" encoding="utf-8"?>
+<p:properties xmlns:p="http://schemas.microsoft.com/office/2006/metadata/properties" xmlns:xsi="http://www.w3.org/2001/XMLSchema-instance" xmlns:pc="http://schemas.microsoft.com/office/infopath/2007/PartnerControls">
+  <documentManagement/>
+</p:properties>
+</file>
+
+<file path=customXml/itemProps1.xml><?xml version="1.0" encoding="utf-8"?>
+<ds:datastoreItem xmlns:ds="http://schemas.openxmlformats.org/officeDocument/2006/customXml" ds:itemID="{7041B68B-F842-48D9-96B7-A1366A271005}">
+  <ds:schemaRefs>
+    <ds:schemaRef ds:uri="http://schemas.microsoft.com/sharepoint/v3/contenttype/forms"/>
+  </ds:schemaRefs>
+</ds:datastoreItem>
+</file>
+
+<file path=customXml/itemProps2.xml><?xml version="1.0" encoding="utf-8"?>
+<ds:datastoreItem xmlns:ds="http://schemas.openxmlformats.org/officeDocument/2006/customXml" ds:itemID="{836425B1-E9FF-4320-BC89-0F5C147334D5}">
+  <ds:schemaRefs>
+    <ds:schemaRef ds:uri="http://schemas.microsoft.com/office/2006/metadata/contentType"/>
+    <ds:schemaRef ds:uri="http://schemas.microsoft.com/office/2006/metadata/properties/metaAttributes"/>
+    <ds:schemaRef ds:uri="http://www.w3.org/2001/XMLSchema"/>
+    <ds:schemaRef ds:uri="http://schemas.microsoft.com/office/2006/metadata/properties"/>
+    <ds:schemaRef ds:uri="5deb6c97-c936-4308-81a8-b8a75559ecd6"/>
+    <ds:schemaRef ds:uri="a032c742-003c-4072-a5d2-2b436e1cb932"/>
+    <ds:schemaRef ds:uri="http://schemas.microsoft.com/office/2006/documentManagement/types"/>
+    <ds:schemaRef ds:uri="http://schemas.microsoft.com/office/infopath/2007/PartnerControls"/>
+    <ds:schemaRef ds:uri="http://schemas.openxmlformats.org/package/2006/metadata/core-properties"/>
+    <ds:schemaRef ds:uri="http://purl.org/dc/elements/1.1/"/>
+    <ds:schemaRef ds:uri="http://purl.org/dc/terms/"/>
+    <ds:schemaRef ds:uri="http://schemas.microsoft.com/internal/obd"/>
+  </ds:schemaRefs>
+</ds:datastoreItem>
+</file>
+
+<file path=customXml/itemProps3.xml><?xml version="1.0" encoding="utf-8"?>
+<ds:datastoreItem xmlns:ds="http://schemas.openxmlformats.org/officeDocument/2006/customXml" ds:itemID="{6AC102E1-FE90-45F8-8067-F00861D4DDC0}">
+  <ds:schemaRefs>
+    <ds:schemaRef ds:uri="http://purl.org/dc/terms/"/>
+    <ds:schemaRef ds:uri="http://schemas.openxmlformats.org/package/2006/metadata/core-properties"/>
+    <ds:schemaRef ds:uri="http://schemas.microsoft.com/office/2006/documentManagement/types"/>
+    <ds:schemaRef ds:uri="http://schemas.microsoft.com/office/infopath/2007/PartnerControls"/>
+    <ds:schemaRef ds:uri="a032c742-003c-4072-a5d2-2b436e1cb932"/>
+    <ds:schemaRef ds:uri="http://purl.org/dc/elements/1.1/"/>
+    <ds:schemaRef ds:uri="http://schemas.microsoft.com/office/2006/metadata/properties"/>
+    <ds:schemaRef ds:uri="5deb6c97-c936-4308-81a8-b8a75559ecd6"/>
+    <ds:schemaRef ds:uri="http://www.w3.org/XML/1998/namespace"/>
+    <ds:schemaRef ds:uri="http://purl.org/dc/dcmitype/"/>
+  </ds:schemaRefs>
+</ds:datastoreItem>
 </file>
</xml_diff>